<commit_message>
mixed mode (old and new) bug fixed
</commit_message>
<xml_diff>
--- a/spec/ClassDiagram.pptx
+++ b/spec/ClassDiagram.pptx
@@ -288,7 +288,7 @@
           <a:p>
             <a:fld id="{837CB51B-EB14-4160-B927-04031DCD17B2}" type="datetimeFigureOut">
               <a:rPr lang="en-US" smtClean="0"/>
-              <a:t>8/14/2015</a:t>
+              <a:t>8/18/2015</a:t>
             </a:fld>
             <a:endParaRPr lang="en-US"/>
           </a:p>
@@ -458,7 +458,7 @@
           <a:p>
             <a:fld id="{837CB51B-EB14-4160-B927-04031DCD17B2}" type="datetimeFigureOut">
               <a:rPr lang="en-US" smtClean="0"/>
-              <a:t>8/14/2015</a:t>
+              <a:t>8/18/2015</a:t>
             </a:fld>
             <a:endParaRPr lang="en-US"/>
           </a:p>
@@ -638,7 +638,7 @@
           <a:p>
             <a:fld id="{837CB51B-EB14-4160-B927-04031DCD17B2}" type="datetimeFigureOut">
               <a:rPr lang="en-US" smtClean="0"/>
-              <a:t>8/14/2015</a:t>
+              <a:t>8/18/2015</a:t>
             </a:fld>
             <a:endParaRPr lang="en-US"/>
           </a:p>
@@ -808,7 +808,7 @@
           <a:p>
             <a:fld id="{837CB51B-EB14-4160-B927-04031DCD17B2}" type="datetimeFigureOut">
               <a:rPr lang="en-US" smtClean="0"/>
-              <a:t>8/14/2015</a:t>
+              <a:t>8/18/2015</a:t>
             </a:fld>
             <a:endParaRPr lang="en-US"/>
           </a:p>
@@ -1054,7 +1054,7 @@
           <a:p>
             <a:fld id="{837CB51B-EB14-4160-B927-04031DCD17B2}" type="datetimeFigureOut">
               <a:rPr lang="en-US" smtClean="0"/>
-              <a:t>8/14/2015</a:t>
+              <a:t>8/18/2015</a:t>
             </a:fld>
             <a:endParaRPr lang="en-US"/>
           </a:p>
@@ -1342,7 +1342,7 @@
           <a:p>
             <a:fld id="{837CB51B-EB14-4160-B927-04031DCD17B2}" type="datetimeFigureOut">
               <a:rPr lang="en-US" smtClean="0"/>
-              <a:t>8/14/2015</a:t>
+              <a:t>8/18/2015</a:t>
             </a:fld>
             <a:endParaRPr lang="en-US"/>
           </a:p>
@@ -1764,7 +1764,7 @@
           <a:p>
             <a:fld id="{837CB51B-EB14-4160-B927-04031DCD17B2}" type="datetimeFigureOut">
               <a:rPr lang="en-US" smtClean="0"/>
-              <a:t>8/14/2015</a:t>
+              <a:t>8/18/2015</a:t>
             </a:fld>
             <a:endParaRPr lang="en-US"/>
           </a:p>
@@ -1882,7 +1882,7 @@
           <a:p>
             <a:fld id="{837CB51B-EB14-4160-B927-04031DCD17B2}" type="datetimeFigureOut">
               <a:rPr lang="en-US" smtClean="0"/>
-              <a:t>8/14/2015</a:t>
+              <a:t>8/18/2015</a:t>
             </a:fld>
             <a:endParaRPr lang="en-US"/>
           </a:p>
@@ -1977,7 +1977,7 @@
           <a:p>
             <a:fld id="{837CB51B-EB14-4160-B927-04031DCD17B2}" type="datetimeFigureOut">
               <a:rPr lang="en-US" smtClean="0"/>
-              <a:t>8/14/2015</a:t>
+              <a:t>8/18/2015</a:t>
             </a:fld>
             <a:endParaRPr lang="en-US"/>
           </a:p>
@@ -2254,7 +2254,7 @@
           <a:p>
             <a:fld id="{837CB51B-EB14-4160-B927-04031DCD17B2}" type="datetimeFigureOut">
               <a:rPr lang="en-US" smtClean="0"/>
-              <a:t>8/14/2015</a:t>
+              <a:t>8/18/2015</a:t>
             </a:fld>
             <a:endParaRPr lang="en-US"/>
           </a:p>
@@ -2507,7 +2507,7 @@
           <a:p>
             <a:fld id="{837CB51B-EB14-4160-B927-04031DCD17B2}" type="datetimeFigureOut">
               <a:rPr lang="en-US" smtClean="0"/>
-              <a:t>8/14/2015</a:t>
+              <a:t>8/18/2015</a:t>
             </a:fld>
             <a:endParaRPr lang="en-US"/>
           </a:p>
@@ -2720,7 +2720,7 @@
           <a:p>
             <a:fld id="{837CB51B-EB14-4160-B927-04031DCD17B2}" type="datetimeFigureOut">
               <a:rPr lang="en-US" smtClean="0"/>
-              <a:t>8/14/2015</a:t>
+              <a:t>8/18/2015</a:t>
             </a:fld>
             <a:endParaRPr lang="en-US"/>
           </a:p>
@@ -3145,8 +3145,8 @@
         </p:nvSpPr>
         <p:spPr>
           <a:xfrm>
-            <a:off x="2035629" y="3139782"/>
-            <a:ext cx="4191000" cy="1905000"/>
+            <a:off x="2035628" y="3139782"/>
+            <a:ext cx="4845845" cy="1905000"/>
           </a:xfrm>
           <a:prstGeom prst="roundRect">
             <a:avLst/>
@@ -3228,7 +3228,7 @@
         </p:nvSpPr>
         <p:spPr>
           <a:xfrm>
-            <a:off x="533400" y="3756804"/>
+            <a:off x="458586" y="3744103"/>
             <a:ext cx="1167245" cy="455221"/>
           </a:xfrm>
           <a:prstGeom prst="roundRect">
@@ -3262,42 +3262,6 @@
           </a:p>
         </p:txBody>
       </p:sp>
-      <p:cxnSp>
-        <p:nvCxnSpPr>
-          <p:cNvPr id="12" name="Elbow Connector 11"/>
-          <p:cNvCxnSpPr>
-            <a:stCxn id="10" idx="0"/>
-            <a:endCxn id="8" idx="1"/>
-          </p:cNvCxnSpPr>
-          <p:nvPr/>
-        </p:nvCxnSpPr>
-        <p:spPr>
-          <a:xfrm rot="5400000" flipH="1" flipV="1">
-            <a:off x="1423431" y="2216352"/>
-            <a:ext cx="1234045" cy="1846861"/>
-          </a:xfrm>
-          <a:prstGeom prst="bentConnector2">
-            <a:avLst/>
-          </a:prstGeom>
-          <a:ln w="38100">
-            <a:prstDash val="sysDash"/>
-          </a:ln>
-        </p:spPr>
-        <p:style>
-          <a:lnRef idx="1">
-            <a:schemeClr val="accent1"/>
-          </a:lnRef>
-          <a:fillRef idx="0">
-            <a:schemeClr val="accent1"/>
-          </a:fillRef>
-          <a:effectRef idx="0">
-            <a:schemeClr val="accent1"/>
-          </a:effectRef>
-          <a:fontRef idx="minor">
-            <a:schemeClr val="tx1"/>
-          </a:fontRef>
-        </p:style>
-      </p:cxnSp>
       <p:cxnSp>
         <p:nvCxnSpPr>
           <p:cNvPr id="14" name="Straight Arrow Connector 13"/>
@@ -3451,21 +3415,25 @@
       <p:cxnSp>
         <p:nvCxnSpPr>
           <p:cNvPr id="21" name="Elbow Connector 20"/>
-          <p:cNvCxnSpPr/>
+          <p:cNvCxnSpPr>
+            <a:endCxn id="10" idx="2"/>
+          </p:cNvCxnSpPr>
           <p:nvPr/>
         </p:nvCxnSpPr>
         <p:spPr>
-          <a:xfrm rot="5400000" flipH="1" flipV="1">
-            <a:off x="752228" y="4660443"/>
-            <a:ext cx="1143992" cy="247156"/>
+          <a:xfrm rot="16200000" flipV="1">
+            <a:off x="712218" y="4529315"/>
+            <a:ext cx="1156694" cy="496711"/>
           </a:xfrm>
           <a:prstGeom prst="bentConnector3">
             <a:avLst>
-              <a:gd name="adj1" fmla="val 66609"/>
+              <a:gd name="adj1" fmla="val 64594"/>
             </a:avLst>
           </a:prstGeom>
           <a:ln w="38100">
             <a:prstDash val="sysDash"/>
+            <a:headEnd type="oval" w="med" len="med"/>
+            <a:tailEnd type="oval" w="med" len="med"/>
           </a:ln>
         </p:spPr>
         <p:style>
@@ -3486,21 +3454,23 @@
       <p:cxnSp>
         <p:nvCxnSpPr>
           <p:cNvPr id="26" name="Elbow Connector 25"/>
-          <p:cNvCxnSpPr/>
+          <p:cNvCxnSpPr>
+            <a:stCxn id="10" idx="2"/>
+          </p:cNvCxnSpPr>
           <p:nvPr/>
         </p:nvCxnSpPr>
         <p:spPr>
-          <a:xfrm>
-            <a:off x="1458564" y="4594015"/>
-            <a:ext cx="577065" cy="12700"/>
-          </a:xfrm>
-          <a:prstGeom prst="bentConnector3">
-            <a:avLst>
-              <a:gd name="adj1" fmla="val 50000"/>
-            </a:avLst>
+          <a:xfrm rot="16200000" flipH="1">
+            <a:off x="1335224" y="3906309"/>
+            <a:ext cx="407391" cy="993420"/>
+          </a:xfrm>
+          <a:prstGeom prst="bentConnector2">
+            <a:avLst/>
           </a:prstGeom>
           <a:ln w="38100">
             <a:prstDash val="sysDash"/>
+            <a:headEnd type="oval" w="med" len="med"/>
+            <a:tailEnd type="oval" w="med" len="med"/>
           </a:ln>
         </p:spPr>
         <p:style>
@@ -3526,8 +3496,8 @@
         </p:nvSpPr>
         <p:spPr>
           <a:xfrm>
-            <a:off x="7368639" y="3147204"/>
-            <a:ext cx="1524000" cy="1897577"/>
+            <a:off x="7619999" y="3147204"/>
+            <a:ext cx="1272639" cy="1897577"/>
           </a:xfrm>
           <a:prstGeom prst="roundRect">
             <a:avLst/>
@@ -3616,9 +3586,9 @@
           <p:nvPr/>
         </p:nvCxnSpPr>
         <p:spPr>
-          <a:xfrm>
-            <a:off x="2963884" y="4606715"/>
-            <a:ext cx="84116" cy="1358900"/>
+          <a:xfrm flipH="1">
+            <a:off x="3368065" y="4600365"/>
+            <a:ext cx="1090485" cy="1352938"/>
           </a:xfrm>
           <a:prstGeom prst="straightConnector1">
             <a:avLst/>
@@ -3650,8 +3620,8 @@
         </p:nvCxnSpPr>
         <p:spPr>
           <a:xfrm flipV="1">
-            <a:off x="3547506" y="4606715"/>
-            <a:ext cx="948294" cy="1358900"/>
+            <a:off x="3702319" y="4594015"/>
+            <a:ext cx="1772517" cy="1371600"/>
           </a:xfrm>
           <a:prstGeom prst="straightConnector1">
             <a:avLst/>
@@ -3683,8 +3653,8 @@
         </p:nvCxnSpPr>
         <p:spPr>
           <a:xfrm>
-            <a:off x="5791200" y="4184067"/>
-            <a:ext cx="1577439" cy="1"/>
+            <a:off x="6567919" y="4184067"/>
+            <a:ext cx="1052080" cy="27958"/>
           </a:xfrm>
           <a:prstGeom prst="straightConnector1">
             <a:avLst/>
@@ -3800,7 +3770,7 @@
         </p:nvSpPr>
         <p:spPr>
           <a:xfrm>
-            <a:off x="3048000" y="3756804"/>
+            <a:off x="4609446" y="3756804"/>
             <a:ext cx="217219" cy="214910"/>
           </a:xfrm>
           <a:prstGeom prst="ellipse">
@@ -3842,7 +3812,7 @@
         </p:nvSpPr>
         <p:spPr>
           <a:xfrm>
-            <a:off x="4920589" y="3746657"/>
+            <a:off x="5671024" y="3746657"/>
             <a:ext cx="217219" cy="214910"/>
           </a:xfrm>
           <a:prstGeom prst="ellipse">
@@ -3884,8 +3854,8 @@
         </p:nvSpPr>
         <p:spPr>
           <a:xfrm>
-            <a:off x="2438400" y="3984414"/>
-            <a:ext cx="1524000" cy="622301"/>
+            <a:off x="4234137" y="3984414"/>
+            <a:ext cx="1083402" cy="622301"/>
           </a:xfrm>
           <a:prstGeom prst="roundRect">
             <a:avLst/>
@@ -3906,7 +3876,7 @@
           </a:fontRef>
         </p:style>
         <p:txBody>
-          <a:bodyPr rtlCol="0" anchor="ctr"/>
+          <a:bodyPr lIns="0" tIns="0" rIns="0" bIns="0" rtlCol="0" anchor="ctr"/>
           <a:lstStyle/>
           <a:p>
             <a:pPr algn="ctr"/>
@@ -3933,8 +3903,8 @@
         </p:nvSpPr>
         <p:spPr>
           <a:xfrm>
-            <a:off x="4267200" y="3971714"/>
-            <a:ext cx="1524000" cy="622301"/>
+            <a:off x="5474836" y="3971714"/>
+            <a:ext cx="1093083" cy="622301"/>
           </a:xfrm>
           <a:prstGeom prst="roundRect">
             <a:avLst/>
@@ -3955,19 +3925,19 @@
           </a:fontRef>
         </p:style>
         <p:txBody>
-          <a:bodyPr rtlCol="0" anchor="ctr"/>
+          <a:bodyPr lIns="0" tIns="0" rIns="0" bIns="0" rtlCol="0" anchor="ctr"/>
           <a:lstStyle/>
           <a:p>
             <a:pPr algn="ctr"/>
             <a:r>
-              <a:rPr lang="en-US" dirty="0" smtClean="0"/>
+              <a:rPr lang="en-US" dirty="0"/>
               <a:t>Verify</a:t>
             </a:r>
           </a:p>
           <a:p>
             <a:pPr algn="ctr"/>
             <a:r>
-              <a:rPr lang="en-US" dirty="0" smtClean="0"/>
+              <a:rPr lang="en-US" dirty="0"/>
               <a:t>Token</a:t>
             </a:r>
             <a:endParaRPr lang="en-US" dirty="0"/>
@@ -3982,8 +3952,8 @@
         </p:nvCxnSpPr>
         <p:spPr>
           <a:xfrm flipH="1">
-            <a:off x="4920589" y="4600365"/>
-            <a:ext cx="304430" cy="1355105"/>
+            <a:off x="4920590" y="4612677"/>
+            <a:ext cx="967653" cy="1342793"/>
           </a:xfrm>
           <a:prstGeom prst="straightConnector1">
             <a:avLst/>
@@ -4014,9 +3984,9 @@
           <p:nvPr/>
         </p:nvCxnSpPr>
         <p:spPr>
-          <a:xfrm>
-            <a:off x="5486400" y="4606715"/>
-            <a:ext cx="331085" cy="1358900"/>
+          <a:xfrm flipH="1">
+            <a:off x="5817485" y="4612677"/>
+            <a:ext cx="409144" cy="1352938"/>
           </a:xfrm>
           <a:prstGeom prst="straightConnector1">
             <a:avLst/>
@@ -4048,8 +4018,8 @@
         </p:nvCxnSpPr>
         <p:spPr>
           <a:xfrm flipH="1">
-            <a:off x="5817485" y="4441616"/>
-            <a:ext cx="1551154" cy="0"/>
+            <a:off x="6567919" y="4441616"/>
+            <a:ext cx="1052080" cy="0"/>
           </a:xfrm>
           <a:prstGeom prst="straightConnector1">
             <a:avLst/>
@@ -4081,7 +4051,7 @@
         </p:nvSpPr>
         <p:spPr>
           <a:xfrm>
-            <a:off x="6452660" y="3474577"/>
+            <a:off x="6881474" y="3420937"/>
             <a:ext cx="576825" cy="646331"/>
           </a:xfrm>
           <a:prstGeom prst="rect">
@@ -4199,7 +4169,7 @@
         <p:spPr>
           <a:xfrm>
             <a:off x="4888921" y="559131"/>
-            <a:ext cx="3241718" cy="2588073"/>
+            <a:ext cx="3367398" cy="2588073"/>
           </a:xfrm>
           <a:prstGeom prst="bentConnector2">
             <a:avLst/>
@@ -4284,6 +4254,212 @@
           </a:p>
         </p:txBody>
       </p:sp>
+      <p:sp>
+        <p:nvSpPr>
+          <p:cNvPr id="38" name="Rounded Rectangle 37"/>
+          <p:cNvSpPr/>
+          <p:nvPr/>
+        </p:nvSpPr>
+        <p:spPr>
+          <a:xfrm>
+            <a:off x="3265034" y="3990376"/>
+            <a:ext cx="850321" cy="622301"/>
+          </a:xfrm>
+          <a:prstGeom prst="roundRect">
+            <a:avLst/>
+          </a:prstGeom>
+        </p:spPr>
+        <p:style>
+          <a:lnRef idx="1">
+            <a:schemeClr val="accent4"/>
+          </a:lnRef>
+          <a:fillRef idx="2">
+            <a:schemeClr val="accent4"/>
+          </a:fillRef>
+          <a:effectRef idx="1">
+            <a:schemeClr val="accent4"/>
+          </a:effectRef>
+          <a:fontRef idx="minor">
+            <a:schemeClr val="dk1"/>
+          </a:fontRef>
+        </p:style>
+        <p:txBody>
+          <a:bodyPr lIns="0" tIns="0" rIns="0" bIns="0" rtlCol="0" anchor="ctr"/>
+          <a:lstStyle/>
+          <a:p>
+            <a:pPr algn="ctr"/>
+            <a:r>
+              <a:rPr lang="en-US" dirty="0" smtClean="0"/>
+              <a:t>logout</a:t>
+            </a:r>
+            <a:endParaRPr lang="en-US" dirty="0"/>
+          </a:p>
+        </p:txBody>
+      </p:sp>
+      <p:sp>
+        <p:nvSpPr>
+          <p:cNvPr id="40" name="Oval 39"/>
+          <p:cNvSpPr/>
+          <p:nvPr/>
+        </p:nvSpPr>
+        <p:spPr>
+          <a:xfrm>
+            <a:off x="3605709" y="3768765"/>
+            <a:ext cx="217219" cy="214910"/>
+          </a:xfrm>
+          <a:prstGeom prst="ellipse">
+            <a:avLst/>
+          </a:prstGeom>
+        </p:spPr>
+        <p:style>
+          <a:lnRef idx="1">
+            <a:schemeClr val="accent4"/>
+          </a:lnRef>
+          <a:fillRef idx="2">
+            <a:schemeClr val="accent4"/>
+          </a:fillRef>
+          <a:effectRef idx="1">
+            <a:schemeClr val="accent4"/>
+          </a:effectRef>
+          <a:fontRef idx="minor">
+            <a:schemeClr val="dk1"/>
+          </a:fontRef>
+        </p:style>
+        <p:txBody>
+          <a:bodyPr rtlCol="0" anchor="ctr"/>
+          <a:lstStyle/>
+          <a:p>
+            <a:pPr algn="ctr"/>
+            <a:endParaRPr lang="en-US">
+              <a:solidFill>
+                <a:schemeClr val="dk1"/>
+              </a:solidFill>
+            </a:endParaRPr>
+          </a:p>
+        </p:txBody>
+      </p:sp>
+      <p:sp>
+        <p:nvSpPr>
+          <p:cNvPr id="52" name="Rounded Rectangle 51"/>
+          <p:cNvSpPr/>
+          <p:nvPr/>
+        </p:nvSpPr>
+        <p:spPr>
+          <a:xfrm>
+            <a:off x="2241839" y="3990375"/>
+            <a:ext cx="850321" cy="622301"/>
+          </a:xfrm>
+          <a:prstGeom prst="roundRect">
+            <a:avLst/>
+          </a:prstGeom>
+        </p:spPr>
+        <p:style>
+          <a:lnRef idx="1">
+            <a:schemeClr val="accent4"/>
+          </a:lnRef>
+          <a:fillRef idx="2">
+            <a:schemeClr val="accent4"/>
+          </a:fillRef>
+          <a:effectRef idx="1">
+            <a:schemeClr val="accent4"/>
+          </a:effectRef>
+          <a:fontRef idx="minor">
+            <a:schemeClr val="dk1"/>
+          </a:fontRef>
+        </p:style>
+        <p:txBody>
+          <a:bodyPr lIns="0" tIns="0" rIns="0" bIns="0" rtlCol="0" anchor="ctr"/>
+          <a:lstStyle/>
+          <a:p>
+            <a:pPr algn="ctr"/>
+            <a:r>
+              <a:rPr lang="en-US" dirty="0" smtClean="0"/>
+              <a:t>query</a:t>
+            </a:r>
+            <a:endParaRPr lang="en-US" dirty="0"/>
+          </a:p>
+        </p:txBody>
+      </p:sp>
+      <p:sp>
+        <p:nvSpPr>
+          <p:cNvPr id="54" name="Oval 53"/>
+          <p:cNvSpPr/>
+          <p:nvPr/>
+        </p:nvSpPr>
+        <p:spPr>
+          <a:xfrm>
+            <a:off x="2558389" y="3804902"/>
+            <a:ext cx="217219" cy="214910"/>
+          </a:xfrm>
+          <a:prstGeom prst="ellipse">
+            <a:avLst/>
+          </a:prstGeom>
+        </p:spPr>
+        <p:style>
+          <a:lnRef idx="1">
+            <a:schemeClr val="accent4"/>
+          </a:lnRef>
+          <a:fillRef idx="2">
+            <a:schemeClr val="accent4"/>
+          </a:fillRef>
+          <a:effectRef idx="1">
+            <a:schemeClr val="accent4"/>
+          </a:effectRef>
+          <a:fontRef idx="minor">
+            <a:schemeClr val="dk1"/>
+          </a:fontRef>
+        </p:style>
+        <p:txBody>
+          <a:bodyPr rtlCol="0" anchor="ctr"/>
+          <a:lstStyle/>
+          <a:p>
+            <a:pPr algn="ctr"/>
+            <a:endParaRPr lang="en-US">
+              <a:solidFill>
+                <a:schemeClr val="dk1"/>
+              </a:solidFill>
+            </a:endParaRPr>
+          </a:p>
+        </p:txBody>
+      </p:sp>
+      <p:cxnSp>
+        <p:nvCxnSpPr>
+          <p:cNvPr id="12" name="Elbow Connector 11"/>
+          <p:cNvCxnSpPr>
+            <a:stCxn id="10" idx="0"/>
+            <a:endCxn id="8" idx="1"/>
+          </p:cNvCxnSpPr>
+          <p:nvPr/>
+        </p:nvCxnSpPr>
+        <p:spPr>
+          <a:xfrm rot="5400000" flipH="1" flipV="1">
+            <a:off x="1392374" y="2172594"/>
+            <a:ext cx="1221344" cy="1921675"/>
+          </a:xfrm>
+          <a:prstGeom prst="bentConnector2">
+            <a:avLst/>
+          </a:prstGeom>
+          <a:ln w="38100">
+            <a:prstDash val="sysDash"/>
+            <a:headEnd type="oval" w="med" len="med"/>
+            <a:tailEnd type="oval" w="med" len="med"/>
+          </a:ln>
+        </p:spPr>
+        <p:style>
+          <a:lnRef idx="1">
+            <a:schemeClr val="accent1"/>
+          </a:lnRef>
+          <a:fillRef idx="0">
+            <a:schemeClr val="accent1"/>
+          </a:fillRef>
+          <a:effectRef idx="0">
+            <a:schemeClr val="accent1"/>
+          </a:effectRef>
+          <a:fontRef idx="minor">
+            <a:schemeClr val="tx1"/>
+          </a:fontRef>
+        </p:style>
+      </p:cxnSp>
     </p:spTree>
     <p:extLst>
       <p:ext uri="{BB962C8B-B14F-4D97-AF65-F5344CB8AC3E}">

</xml_diff>

<commit_message>
updated the documetnation on the lightweight protocol
</commit_message>
<xml_diff>
--- a/spec/ClassDiagram.pptx
+++ b/spec/ClassDiagram.pptx
@@ -6,6 +6,12 @@
   </p:sldMasterIdLst>
   <p:sldIdLst>
     <p:sldId id="256" r:id="rId2"/>
+    <p:sldId id="257" r:id="rId3"/>
+    <p:sldId id="260" r:id="rId4"/>
+    <p:sldId id="261" r:id="rId5"/>
+    <p:sldId id="262" r:id="rId6"/>
+    <p:sldId id="263" r:id="rId7"/>
+    <p:sldId id="264" r:id="rId8"/>
   </p:sldIdLst>
   <p:sldSz cx="9144000" cy="6858000" type="screen4x3"/>
   <p:notesSz cx="6858000" cy="9144000"/>
@@ -288,7 +294,7 @@
           <a:p>
             <a:fld id="{837CB51B-EB14-4160-B927-04031DCD17B2}" type="datetimeFigureOut">
               <a:rPr lang="en-US" smtClean="0"/>
-              <a:t>8/18/2015</a:t>
+              <a:t>10/7/2015</a:t>
             </a:fld>
             <a:endParaRPr lang="en-US"/>
           </a:p>
@@ -458,7 +464,7 @@
           <a:p>
             <a:fld id="{837CB51B-EB14-4160-B927-04031DCD17B2}" type="datetimeFigureOut">
               <a:rPr lang="en-US" smtClean="0"/>
-              <a:t>8/18/2015</a:t>
+              <a:t>10/7/2015</a:t>
             </a:fld>
             <a:endParaRPr lang="en-US"/>
           </a:p>
@@ -638,7 +644,7 @@
           <a:p>
             <a:fld id="{837CB51B-EB14-4160-B927-04031DCD17B2}" type="datetimeFigureOut">
               <a:rPr lang="en-US" smtClean="0"/>
-              <a:t>8/18/2015</a:t>
+              <a:t>10/7/2015</a:t>
             </a:fld>
             <a:endParaRPr lang="en-US"/>
           </a:p>
@@ -808,7 +814,7 @@
           <a:p>
             <a:fld id="{837CB51B-EB14-4160-B927-04031DCD17B2}" type="datetimeFigureOut">
               <a:rPr lang="en-US" smtClean="0"/>
-              <a:t>8/18/2015</a:t>
+              <a:t>10/7/2015</a:t>
             </a:fld>
             <a:endParaRPr lang="en-US"/>
           </a:p>
@@ -1054,7 +1060,7 @@
           <a:p>
             <a:fld id="{837CB51B-EB14-4160-B927-04031DCD17B2}" type="datetimeFigureOut">
               <a:rPr lang="en-US" smtClean="0"/>
-              <a:t>8/18/2015</a:t>
+              <a:t>10/7/2015</a:t>
             </a:fld>
             <a:endParaRPr lang="en-US"/>
           </a:p>
@@ -1342,7 +1348,7 @@
           <a:p>
             <a:fld id="{837CB51B-EB14-4160-B927-04031DCD17B2}" type="datetimeFigureOut">
               <a:rPr lang="en-US" smtClean="0"/>
-              <a:t>8/18/2015</a:t>
+              <a:t>10/7/2015</a:t>
             </a:fld>
             <a:endParaRPr lang="en-US"/>
           </a:p>
@@ -1764,7 +1770,7 @@
           <a:p>
             <a:fld id="{837CB51B-EB14-4160-B927-04031DCD17B2}" type="datetimeFigureOut">
               <a:rPr lang="en-US" smtClean="0"/>
-              <a:t>8/18/2015</a:t>
+              <a:t>10/7/2015</a:t>
             </a:fld>
             <a:endParaRPr lang="en-US"/>
           </a:p>
@@ -1882,7 +1888,7 @@
           <a:p>
             <a:fld id="{837CB51B-EB14-4160-B927-04031DCD17B2}" type="datetimeFigureOut">
               <a:rPr lang="en-US" smtClean="0"/>
-              <a:t>8/18/2015</a:t>
+              <a:t>10/7/2015</a:t>
             </a:fld>
             <a:endParaRPr lang="en-US"/>
           </a:p>
@@ -1977,7 +1983,7 @@
           <a:p>
             <a:fld id="{837CB51B-EB14-4160-B927-04031DCD17B2}" type="datetimeFigureOut">
               <a:rPr lang="en-US" smtClean="0"/>
-              <a:t>8/18/2015</a:t>
+              <a:t>10/7/2015</a:t>
             </a:fld>
             <a:endParaRPr lang="en-US"/>
           </a:p>
@@ -2254,7 +2260,7 @@
           <a:p>
             <a:fld id="{837CB51B-EB14-4160-B927-04031DCD17B2}" type="datetimeFigureOut">
               <a:rPr lang="en-US" smtClean="0"/>
-              <a:t>8/18/2015</a:t>
+              <a:t>10/7/2015</a:t>
             </a:fld>
             <a:endParaRPr lang="en-US"/>
           </a:p>
@@ -2507,7 +2513,7 @@
           <a:p>
             <a:fld id="{837CB51B-EB14-4160-B927-04031DCD17B2}" type="datetimeFigureOut">
               <a:rPr lang="en-US" smtClean="0"/>
-              <a:t>8/18/2015</a:t>
+              <a:t>10/7/2015</a:t>
             </a:fld>
             <a:endParaRPr lang="en-US"/>
           </a:p>
@@ -2720,7 +2726,7 @@
           <a:p>
             <a:fld id="{837CB51B-EB14-4160-B927-04031DCD17B2}" type="datetimeFigureOut">
               <a:rPr lang="en-US" smtClean="0"/>
-              <a:t>8/18/2015</a:t>
+              <a:t>10/7/2015</a:t>
             </a:fld>
             <a:endParaRPr lang="en-US"/>
           </a:p>
@@ -3940,7 +3946,6 @@
               <a:rPr lang="en-US" dirty="0"/>
               <a:t>Token</a:t>
             </a:r>
-            <a:endParaRPr lang="en-US" dirty="0"/>
           </a:p>
         </p:txBody>
       </p:sp>
@@ -4464,6 +4469,1710 @@
     <p:extLst>
       <p:ext uri="{BB962C8B-B14F-4D97-AF65-F5344CB8AC3E}">
         <p14:creationId xmlns:p14="http://schemas.microsoft.com/office/powerpoint/2010/main" val="3936641792"/>
+      </p:ext>
+    </p:extLst>
+  </p:cSld>
+  <p:clrMapOvr>
+    <a:masterClrMapping/>
+  </p:clrMapOvr>
+</p:sld>
+</file>
+
+<file path=ppt/slides/slide2.xml><?xml version="1.0" encoding="utf-8"?>
+<p:sld xmlns:a="http://schemas.openxmlformats.org/drawingml/2006/main" xmlns:r="http://schemas.openxmlformats.org/officeDocument/2006/relationships" xmlns:p="http://schemas.openxmlformats.org/presentationml/2006/main">
+  <p:cSld>
+    <p:spTree>
+      <p:nvGrpSpPr>
+        <p:cNvPr id="1" name=""/>
+        <p:cNvGrpSpPr/>
+        <p:nvPr/>
+      </p:nvGrpSpPr>
+      <p:grpSpPr>
+        <a:xfrm>
+          <a:off x="0" y="0"/>
+          <a:ext cx="0" cy="0"/>
+          <a:chOff x="0" y="0"/>
+          <a:chExt cx="0" cy="0"/>
+        </a:xfrm>
+      </p:grpSpPr>
+      <p:sp>
+        <p:nvSpPr>
+          <p:cNvPr id="2" name="Rounded Rectangle 1"/>
+          <p:cNvSpPr/>
+          <p:nvPr/>
+        </p:nvSpPr>
+        <p:spPr>
+          <a:xfrm>
+            <a:off x="3124200" y="1393371"/>
+            <a:ext cx="2057400" cy="1143000"/>
+          </a:xfrm>
+          <a:prstGeom prst="roundRect">
+            <a:avLst/>
+          </a:prstGeom>
+        </p:spPr>
+        <p:style>
+          <a:lnRef idx="1">
+            <a:schemeClr val="accent5"/>
+          </a:lnRef>
+          <a:fillRef idx="2">
+            <a:schemeClr val="accent5"/>
+          </a:fillRef>
+          <a:effectRef idx="1">
+            <a:schemeClr val="accent5"/>
+          </a:effectRef>
+          <a:fontRef idx="minor">
+            <a:schemeClr val="dk1"/>
+          </a:fontRef>
+        </p:style>
+        <p:txBody>
+          <a:bodyPr rtlCol="0" anchor="ctr"/>
+          <a:lstStyle/>
+          <a:p>
+            <a:pPr algn="ctr"/>
+            <a:r>
+              <a:rPr lang="en-US" dirty="0" smtClean="0"/>
+              <a:t>Identity Provider</a:t>
+            </a:r>
+          </a:p>
+          <a:p>
+            <a:pPr algn="ctr"/>
+            <a:r>
+              <a:rPr lang="en-US" dirty="0" smtClean="0"/>
+              <a:t>(SSOFI)</a:t>
+            </a:r>
+            <a:endParaRPr lang="en-US" dirty="0"/>
+          </a:p>
+        </p:txBody>
+      </p:sp>
+      <p:sp>
+        <p:nvSpPr>
+          <p:cNvPr id="3" name="Rounded Rectangle 2"/>
+          <p:cNvSpPr/>
+          <p:nvPr/>
+        </p:nvSpPr>
+        <p:spPr>
+          <a:xfrm>
+            <a:off x="1368012" y="3733800"/>
+            <a:ext cx="2057400" cy="1143000"/>
+          </a:xfrm>
+          <a:prstGeom prst="roundRect">
+            <a:avLst/>
+          </a:prstGeom>
+        </p:spPr>
+        <p:style>
+          <a:lnRef idx="1">
+            <a:schemeClr val="accent5"/>
+          </a:lnRef>
+          <a:fillRef idx="2">
+            <a:schemeClr val="accent5"/>
+          </a:fillRef>
+          <a:effectRef idx="1">
+            <a:schemeClr val="accent5"/>
+          </a:effectRef>
+          <a:fontRef idx="minor">
+            <a:schemeClr val="dk1"/>
+          </a:fontRef>
+        </p:style>
+        <p:txBody>
+          <a:bodyPr rtlCol="0" anchor="ctr"/>
+          <a:lstStyle/>
+          <a:p>
+            <a:pPr algn="ctr"/>
+            <a:r>
+              <a:rPr lang="en-US" dirty="0" smtClean="0"/>
+              <a:t>Client</a:t>
+            </a:r>
+          </a:p>
+          <a:p>
+            <a:pPr algn="ctr"/>
+            <a:r>
+              <a:rPr lang="en-US" dirty="0" smtClean="0"/>
+              <a:t>(Angular JS)</a:t>
+            </a:r>
+            <a:endParaRPr lang="en-US" dirty="0"/>
+          </a:p>
+        </p:txBody>
+      </p:sp>
+      <p:sp>
+        <p:nvSpPr>
+          <p:cNvPr id="4" name="Rounded Rectangle 3"/>
+          <p:cNvSpPr/>
+          <p:nvPr/>
+        </p:nvSpPr>
+        <p:spPr>
+          <a:xfrm>
+            <a:off x="5148943" y="3733800"/>
+            <a:ext cx="2057400" cy="1143000"/>
+          </a:xfrm>
+          <a:prstGeom prst="roundRect">
+            <a:avLst/>
+          </a:prstGeom>
+        </p:spPr>
+        <p:style>
+          <a:lnRef idx="1">
+            <a:schemeClr val="accent5"/>
+          </a:lnRef>
+          <a:fillRef idx="2">
+            <a:schemeClr val="accent5"/>
+          </a:fillRef>
+          <a:effectRef idx="1">
+            <a:schemeClr val="accent5"/>
+          </a:effectRef>
+          <a:fontRef idx="minor">
+            <a:schemeClr val="dk1"/>
+          </a:fontRef>
+        </p:style>
+        <p:txBody>
+          <a:bodyPr rtlCol="0" anchor="ctr"/>
+          <a:lstStyle/>
+          <a:p>
+            <a:pPr algn="ctr"/>
+            <a:r>
+              <a:rPr lang="en-US" dirty="0" smtClean="0"/>
+              <a:t>Server</a:t>
+            </a:r>
+          </a:p>
+          <a:p>
+            <a:pPr algn="ctr"/>
+            <a:r>
+              <a:rPr lang="en-US" dirty="0" smtClean="0"/>
+              <a:t>(Java, Tomcat)</a:t>
+            </a:r>
+            <a:endParaRPr lang="en-US" dirty="0"/>
+          </a:p>
+        </p:txBody>
+      </p:sp>
+      <p:cxnSp>
+        <p:nvCxnSpPr>
+          <p:cNvPr id="5" name="Straight Arrow Connector 4"/>
+          <p:cNvCxnSpPr/>
+          <p:nvPr/>
+        </p:nvCxnSpPr>
+        <p:spPr>
+          <a:xfrm flipV="1">
+            <a:off x="2396712" y="2536371"/>
+            <a:ext cx="1032288" cy="1197429"/>
+          </a:xfrm>
+          <a:prstGeom prst="straightConnector1">
+            <a:avLst/>
+          </a:prstGeom>
+          <a:ln w="57150">
+            <a:tailEnd type="arrow"/>
+          </a:ln>
+        </p:spPr>
+        <p:style>
+          <a:lnRef idx="1">
+            <a:schemeClr val="accent1"/>
+          </a:lnRef>
+          <a:fillRef idx="0">
+            <a:schemeClr val="accent1"/>
+          </a:fillRef>
+          <a:effectRef idx="0">
+            <a:schemeClr val="accent1"/>
+          </a:effectRef>
+          <a:fontRef idx="minor">
+            <a:schemeClr val="tx1"/>
+          </a:fontRef>
+        </p:style>
+      </p:cxnSp>
+      <p:sp>
+        <p:nvSpPr>
+          <p:cNvPr id="7" name="TextBox 6"/>
+          <p:cNvSpPr txBox="1"/>
+          <p:nvPr/>
+        </p:nvSpPr>
+        <p:spPr>
+          <a:xfrm>
+            <a:off x="1698171" y="2765753"/>
+            <a:ext cx="1114408" cy="369332"/>
+          </a:xfrm>
+          <a:prstGeom prst="rect">
+            <a:avLst/>
+          </a:prstGeom>
+          <a:noFill/>
+        </p:spPr>
+        <p:txBody>
+          <a:bodyPr wrap="none" rtlCol="0">
+            <a:spAutoFit/>
+          </a:bodyPr>
+          <a:lstStyle/>
+          <a:p>
+            <a:r>
+              <a:rPr lang="en-US" dirty="0" smtClean="0"/>
+              <a:t>Who Am I</a:t>
+            </a:r>
+            <a:endParaRPr lang="en-US" dirty="0"/>
+          </a:p>
+        </p:txBody>
+      </p:sp>
+    </p:spTree>
+    <p:extLst>
+      <p:ext uri="{BB962C8B-B14F-4D97-AF65-F5344CB8AC3E}">
+        <p14:creationId xmlns:p14="http://schemas.microsoft.com/office/powerpoint/2010/main" val="2313122781"/>
+      </p:ext>
+    </p:extLst>
+  </p:cSld>
+  <p:clrMapOvr>
+    <a:masterClrMapping/>
+  </p:clrMapOvr>
+</p:sld>
+</file>
+
+<file path=ppt/slides/slide3.xml><?xml version="1.0" encoding="utf-8"?>
+<p:sld xmlns:a="http://schemas.openxmlformats.org/drawingml/2006/main" xmlns:r="http://schemas.openxmlformats.org/officeDocument/2006/relationships" xmlns:p="http://schemas.openxmlformats.org/presentationml/2006/main">
+  <p:cSld>
+    <p:spTree>
+      <p:nvGrpSpPr>
+        <p:cNvPr id="1" name=""/>
+        <p:cNvGrpSpPr/>
+        <p:nvPr/>
+      </p:nvGrpSpPr>
+      <p:grpSpPr>
+        <a:xfrm>
+          <a:off x="0" y="0"/>
+          <a:ext cx="0" cy="0"/>
+          <a:chOff x="0" y="0"/>
+          <a:chExt cx="0" cy="0"/>
+        </a:xfrm>
+      </p:grpSpPr>
+      <p:sp>
+        <p:nvSpPr>
+          <p:cNvPr id="2" name="Rounded Rectangle 1"/>
+          <p:cNvSpPr/>
+          <p:nvPr/>
+        </p:nvSpPr>
+        <p:spPr>
+          <a:xfrm>
+            <a:off x="3124200" y="1393371"/>
+            <a:ext cx="2057400" cy="1143000"/>
+          </a:xfrm>
+          <a:prstGeom prst="roundRect">
+            <a:avLst/>
+          </a:prstGeom>
+        </p:spPr>
+        <p:style>
+          <a:lnRef idx="1">
+            <a:schemeClr val="accent5"/>
+          </a:lnRef>
+          <a:fillRef idx="2">
+            <a:schemeClr val="accent5"/>
+          </a:fillRef>
+          <a:effectRef idx="1">
+            <a:schemeClr val="accent5"/>
+          </a:effectRef>
+          <a:fontRef idx="minor">
+            <a:schemeClr val="dk1"/>
+          </a:fontRef>
+        </p:style>
+        <p:txBody>
+          <a:bodyPr rtlCol="0" anchor="ctr"/>
+          <a:lstStyle/>
+          <a:p>
+            <a:pPr algn="ctr"/>
+            <a:r>
+              <a:rPr lang="en-US" dirty="0" smtClean="0"/>
+              <a:t>Identity Provider</a:t>
+            </a:r>
+          </a:p>
+          <a:p>
+            <a:pPr algn="ctr"/>
+            <a:r>
+              <a:rPr lang="en-US" dirty="0" smtClean="0"/>
+              <a:t>(SSOFI)</a:t>
+            </a:r>
+            <a:endParaRPr lang="en-US" dirty="0"/>
+          </a:p>
+        </p:txBody>
+      </p:sp>
+      <p:sp>
+        <p:nvSpPr>
+          <p:cNvPr id="3" name="Rounded Rectangle 2"/>
+          <p:cNvSpPr/>
+          <p:nvPr/>
+        </p:nvSpPr>
+        <p:spPr>
+          <a:xfrm>
+            <a:off x="1368012" y="3733800"/>
+            <a:ext cx="2057400" cy="1143000"/>
+          </a:xfrm>
+          <a:prstGeom prst="roundRect">
+            <a:avLst/>
+          </a:prstGeom>
+        </p:spPr>
+        <p:style>
+          <a:lnRef idx="1">
+            <a:schemeClr val="accent5"/>
+          </a:lnRef>
+          <a:fillRef idx="2">
+            <a:schemeClr val="accent5"/>
+          </a:fillRef>
+          <a:effectRef idx="1">
+            <a:schemeClr val="accent5"/>
+          </a:effectRef>
+          <a:fontRef idx="minor">
+            <a:schemeClr val="dk1"/>
+          </a:fontRef>
+        </p:style>
+        <p:txBody>
+          <a:bodyPr rtlCol="0" anchor="ctr"/>
+          <a:lstStyle/>
+          <a:p>
+            <a:pPr algn="ctr"/>
+            <a:r>
+              <a:rPr lang="en-US" dirty="0" smtClean="0"/>
+              <a:t>Client</a:t>
+            </a:r>
+          </a:p>
+          <a:p>
+            <a:pPr algn="ctr"/>
+            <a:r>
+              <a:rPr lang="en-US" dirty="0" smtClean="0"/>
+              <a:t>(Angular JS)</a:t>
+            </a:r>
+            <a:endParaRPr lang="en-US" dirty="0"/>
+          </a:p>
+        </p:txBody>
+      </p:sp>
+      <p:sp>
+        <p:nvSpPr>
+          <p:cNvPr id="4" name="Rounded Rectangle 3"/>
+          <p:cNvSpPr/>
+          <p:nvPr/>
+        </p:nvSpPr>
+        <p:spPr>
+          <a:xfrm>
+            <a:off x="5148943" y="3733800"/>
+            <a:ext cx="2057400" cy="1143000"/>
+          </a:xfrm>
+          <a:prstGeom prst="roundRect">
+            <a:avLst/>
+          </a:prstGeom>
+        </p:spPr>
+        <p:style>
+          <a:lnRef idx="1">
+            <a:schemeClr val="accent5"/>
+          </a:lnRef>
+          <a:fillRef idx="2">
+            <a:schemeClr val="accent5"/>
+          </a:fillRef>
+          <a:effectRef idx="1">
+            <a:schemeClr val="accent5"/>
+          </a:effectRef>
+          <a:fontRef idx="minor">
+            <a:schemeClr val="dk1"/>
+          </a:fontRef>
+        </p:style>
+        <p:txBody>
+          <a:bodyPr rtlCol="0" anchor="ctr"/>
+          <a:lstStyle/>
+          <a:p>
+            <a:pPr algn="ctr"/>
+            <a:r>
+              <a:rPr lang="en-US" dirty="0" smtClean="0"/>
+              <a:t>Server</a:t>
+            </a:r>
+          </a:p>
+          <a:p>
+            <a:pPr algn="ctr"/>
+            <a:r>
+              <a:rPr lang="en-US" dirty="0" smtClean="0"/>
+              <a:t>(Java, Tomcat)</a:t>
+            </a:r>
+            <a:endParaRPr lang="en-US" dirty="0"/>
+          </a:p>
+        </p:txBody>
+      </p:sp>
+      <p:cxnSp>
+        <p:nvCxnSpPr>
+          <p:cNvPr id="8" name="Straight Arrow Connector 7"/>
+          <p:cNvCxnSpPr>
+            <a:stCxn id="3" idx="3"/>
+            <a:endCxn id="4" idx="1"/>
+          </p:cNvCxnSpPr>
+          <p:nvPr/>
+        </p:nvCxnSpPr>
+        <p:spPr>
+          <a:xfrm>
+            <a:off x="3425412" y="4305300"/>
+            <a:ext cx="1723531" cy="0"/>
+          </a:xfrm>
+          <a:prstGeom prst="straightConnector1">
+            <a:avLst/>
+          </a:prstGeom>
+          <a:ln w="57150">
+            <a:tailEnd type="arrow"/>
+          </a:ln>
+        </p:spPr>
+        <p:style>
+          <a:lnRef idx="1">
+            <a:schemeClr val="accent1"/>
+          </a:lnRef>
+          <a:fillRef idx="0">
+            <a:schemeClr val="accent1"/>
+          </a:fillRef>
+          <a:effectRef idx="0">
+            <a:schemeClr val="accent1"/>
+          </a:effectRef>
+          <a:fontRef idx="minor">
+            <a:schemeClr val="tx1"/>
+          </a:fontRef>
+        </p:style>
+      </p:cxnSp>
+      <p:sp>
+        <p:nvSpPr>
+          <p:cNvPr id="9" name="TextBox 8"/>
+          <p:cNvSpPr txBox="1"/>
+          <p:nvPr/>
+        </p:nvSpPr>
+        <p:spPr>
+          <a:xfrm>
+            <a:off x="3425412" y="3352800"/>
+            <a:ext cx="1704249" cy="646331"/>
+          </a:xfrm>
+          <a:prstGeom prst="rect">
+            <a:avLst/>
+          </a:prstGeom>
+          <a:noFill/>
+        </p:spPr>
+        <p:txBody>
+          <a:bodyPr wrap="none" rtlCol="0">
+            <a:spAutoFit/>
+          </a:bodyPr>
+          <a:lstStyle/>
+          <a:p>
+            <a:pPr algn="ctr"/>
+            <a:r>
+              <a:rPr lang="en-US" dirty="0" smtClean="0"/>
+              <a:t>Query Whether </a:t>
+            </a:r>
+          </a:p>
+          <a:p>
+            <a:pPr algn="ctr"/>
+            <a:r>
+              <a:rPr lang="en-US" dirty="0" smtClean="0"/>
+              <a:t>Logged In</a:t>
+            </a:r>
+            <a:endParaRPr lang="en-US" dirty="0"/>
+          </a:p>
+        </p:txBody>
+      </p:sp>
+    </p:spTree>
+    <p:extLst>
+      <p:ext uri="{BB962C8B-B14F-4D97-AF65-F5344CB8AC3E}">
+        <p14:creationId xmlns:p14="http://schemas.microsoft.com/office/powerpoint/2010/main" val="2045135783"/>
+      </p:ext>
+    </p:extLst>
+  </p:cSld>
+  <p:clrMapOvr>
+    <a:masterClrMapping/>
+  </p:clrMapOvr>
+</p:sld>
+</file>
+
+<file path=ppt/slides/slide4.xml><?xml version="1.0" encoding="utf-8"?>
+<p:sld xmlns:a="http://schemas.openxmlformats.org/drawingml/2006/main" xmlns:r="http://schemas.openxmlformats.org/officeDocument/2006/relationships" xmlns:p="http://schemas.openxmlformats.org/presentationml/2006/main">
+  <p:cSld>
+    <p:spTree>
+      <p:nvGrpSpPr>
+        <p:cNvPr id="1" name=""/>
+        <p:cNvGrpSpPr/>
+        <p:nvPr/>
+      </p:nvGrpSpPr>
+      <p:grpSpPr>
+        <a:xfrm>
+          <a:off x="0" y="0"/>
+          <a:ext cx="0" cy="0"/>
+          <a:chOff x="0" y="0"/>
+          <a:chExt cx="0" cy="0"/>
+        </a:xfrm>
+      </p:grpSpPr>
+      <p:sp>
+        <p:nvSpPr>
+          <p:cNvPr id="2" name="Rounded Rectangle 1"/>
+          <p:cNvSpPr/>
+          <p:nvPr/>
+        </p:nvSpPr>
+        <p:spPr>
+          <a:xfrm>
+            <a:off x="3124200" y="1393371"/>
+            <a:ext cx="2057400" cy="1143000"/>
+          </a:xfrm>
+          <a:prstGeom prst="roundRect">
+            <a:avLst/>
+          </a:prstGeom>
+        </p:spPr>
+        <p:style>
+          <a:lnRef idx="1">
+            <a:schemeClr val="accent5"/>
+          </a:lnRef>
+          <a:fillRef idx="2">
+            <a:schemeClr val="accent5"/>
+          </a:fillRef>
+          <a:effectRef idx="1">
+            <a:schemeClr val="accent5"/>
+          </a:effectRef>
+          <a:fontRef idx="minor">
+            <a:schemeClr val="dk1"/>
+          </a:fontRef>
+        </p:style>
+        <p:txBody>
+          <a:bodyPr rtlCol="0" anchor="ctr"/>
+          <a:lstStyle/>
+          <a:p>
+            <a:pPr algn="ctr"/>
+            <a:r>
+              <a:rPr lang="en-US" dirty="0" smtClean="0"/>
+              <a:t>Identity Provider</a:t>
+            </a:r>
+          </a:p>
+          <a:p>
+            <a:pPr algn="ctr"/>
+            <a:r>
+              <a:rPr lang="en-US" dirty="0" smtClean="0"/>
+              <a:t>(SSOFI)</a:t>
+            </a:r>
+            <a:endParaRPr lang="en-US" dirty="0"/>
+          </a:p>
+        </p:txBody>
+      </p:sp>
+      <p:sp>
+        <p:nvSpPr>
+          <p:cNvPr id="3" name="Rounded Rectangle 2"/>
+          <p:cNvSpPr/>
+          <p:nvPr/>
+        </p:nvSpPr>
+        <p:spPr>
+          <a:xfrm>
+            <a:off x="1368012" y="3733800"/>
+            <a:ext cx="2057400" cy="1143000"/>
+          </a:xfrm>
+          <a:prstGeom prst="roundRect">
+            <a:avLst/>
+          </a:prstGeom>
+        </p:spPr>
+        <p:style>
+          <a:lnRef idx="1">
+            <a:schemeClr val="accent5"/>
+          </a:lnRef>
+          <a:fillRef idx="2">
+            <a:schemeClr val="accent5"/>
+          </a:fillRef>
+          <a:effectRef idx="1">
+            <a:schemeClr val="accent5"/>
+          </a:effectRef>
+          <a:fontRef idx="minor">
+            <a:schemeClr val="dk1"/>
+          </a:fontRef>
+        </p:style>
+        <p:txBody>
+          <a:bodyPr rtlCol="0" anchor="ctr"/>
+          <a:lstStyle/>
+          <a:p>
+            <a:pPr algn="ctr"/>
+            <a:r>
+              <a:rPr lang="en-US" dirty="0" smtClean="0"/>
+              <a:t>Client</a:t>
+            </a:r>
+          </a:p>
+          <a:p>
+            <a:pPr algn="ctr"/>
+            <a:r>
+              <a:rPr lang="en-US" dirty="0" smtClean="0"/>
+              <a:t>(Angular JS)</a:t>
+            </a:r>
+            <a:endParaRPr lang="en-US" dirty="0"/>
+          </a:p>
+        </p:txBody>
+      </p:sp>
+      <p:sp>
+        <p:nvSpPr>
+          <p:cNvPr id="4" name="Rounded Rectangle 3"/>
+          <p:cNvSpPr/>
+          <p:nvPr/>
+        </p:nvSpPr>
+        <p:spPr>
+          <a:xfrm>
+            <a:off x="5148943" y="3733800"/>
+            <a:ext cx="2057400" cy="1143000"/>
+          </a:xfrm>
+          <a:prstGeom prst="roundRect">
+            <a:avLst/>
+          </a:prstGeom>
+        </p:spPr>
+        <p:style>
+          <a:lnRef idx="1">
+            <a:schemeClr val="accent5"/>
+          </a:lnRef>
+          <a:fillRef idx="2">
+            <a:schemeClr val="accent5"/>
+          </a:fillRef>
+          <a:effectRef idx="1">
+            <a:schemeClr val="accent5"/>
+          </a:effectRef>
+          <a:fontRef idx="minor">
+            <a:schemeClr val="dk1"/>
+          </a:fontRef>
+        </p:style>
+        <p:txBody>
+          <a:bodyPr rtlCol="0" anchor="ctr"/>
+          <a:lstStyle/>
+          <a:p>
+            <a:pPr algn="ctr"/>
+            <a:r>
+              <a:rPr lang="en-US" dirty="0" smtClean="0"/>
+              <a:t>Server</a:t>
+            </a:r>
+          </a:p>
+          <a:p>
+            <a:pPr algn="ctr"/>
+            <a:r>
+              <a:rPr lang="en-US" dirty="0" smtClean="0"/>
+              <a:t>(Java, Tomcat)</a:t>
+            </a:r>
+            <a:endParaRPr lang="en-US" dirty="0"/>
+          </a:p>
+        </p:txBody>
+      </p:sp>
+      <p:cxnSp>
+        <p:nvCxnSpPr>
+          <p:cNvPr id="8" name="Straight Arrow Connector 7"/>
+          <p:cNvCxnSpPr>
+            <a:stCxn id="3" idx="3"/>
+            <a:endCxn id="4" idx="1"/>
+          </p:cNvCxnSpPr>
+          <p:nvPr/>
+        </p:nvCxnSpPr>
+        <p:spPr>
+          <a:xfrm>
+            <a:off x="3425412" y="4305300"/>
+            <a:ext cx="1723531" cy="0"/>
+          </a:xfrm>
+          <a:prstGeom prst="straightConnector1">
+            <a:avLst/>
+          </a:prstGeom>
+          <a:ln w="57150">
+            <a:tailEnd type="arrow"/>
+          </a:ln>
+        </p:spPr>
+        <p:style>
+          <a:lnRef idx="1">
+            <a:schemeClr val="accent1"/>
+          </a:lnRef>
+          <a:fillRef idx="0">
+            <a:schemeClr val="accent1"/>
+          </a:fillRef>
+          <a:effectRef idx="0">
+            <a:schemeClr val="accent1"/>
+          </a:effectRef>
+          <a:fontRef idx="minor">
+            <a:schemeClr val="tx1"/>
+          </a:fontRef>
+        </p:style>
+      </p:cxnSp>
+      <p:sp>
+        <p:nvSpPr>
+          <p:cNvPr id="9" name="TextBox 8"/>
+          <p:cNvSpPr txBox="1"/>
+          <p:nvPr/>
+        </p:nvSpPr>
+        <p:spPr>
+          <a:xfrm>
+            <a:off x="3529547" y="3352800"/>
+            <a:ext cx="1495987" cy="369332"/>
+          </a:xfrm>
+          <a:prstGeom prst="rect">
+            <a:avLst/>
+          </a:prstGeom>
+          <a:noFill/>
+        </p:spPr>
+        <p:txBody>
+          <a:bodyPr wrap="none" rtlCol="0">
+            <a:spAutoFit/>
+          </a:bodyPr>
+          <a:lstStyle/>
+          <a:p>
+            <a:pPr algn="ctr"/>
+            <a:r>
+              <a:rPr lang="en-US" dirty="0" smtClean="0"/>
+              <a:t>Get Challenge</a:t>
+            </a:r>
+            <a:endParaRPr lang="en-US" dirty="0"/>
+          </a:p>
+        </p:txBody>
+      </p:sp>
+    </p:spTree>
+    <p:extLst>
+      <p:ext uri="{BB962C8B-B14F-4D97-AF65-F5344CB8AC3E}">
+        <p14:creationId xmlns:p14="http://schemas.microsoft.com/office/powerpoint/2010/main" val="2191513171"/>
+      </p:ext>
+    </p:extLst>
+  </p:cSld>
+  <p:clrMapOvr>
+    <a:masterClrMapping/>
+  </p:clrMapOvr>
+</p:sld>
+</file>
+
+<file path=ppt/slides/slide5.xml><?xml version="1.0" encoding="utf-8"?>
+<p:sld xmlns:a="http://schemas.openxmlformats.org/drawingml/2006/main" xmlns:r="http://schemas.openxmlformats.org/officeDocument/2006/relationships" xmlns:p="http://schemas.openxmlformats.org/presentationml/2006/main">
+  <p:cSld>
+    <p:spTree>
+      <p:nvGrpSpPr>
+        <p:cNvPr id="1" name=""/>
+        <p:cNvGrpSpPr/>
+        <p:nvPr/>
+      </p:nvGrpSpPr>
+      <p:grpSpPr>
+        <a:xfrm>
+          <a:off x="0" y="0"/>
+          <a:ext cx="0" cy="0"/>
+          <a:chOff x="0" y="0"/>
+          <a:chExt cx="0" cy="0"/>
+        </a:xfrm>
+      </p:grpSpPr>
+      <p:sp>
+        <p:nvSpPr>
+          <p:cNvPr id="2" name="Rounded Rectangle 1"/>
+          <p:cNvSpPr/>
+          <p:nvPr/>
+        </p:nvSpPr>
+        <p:spPr>
+          <a:xfrm>
+            <a:off x="3124200" y="1393371"/>
+            <a:ext cx="2057400" cy="1143000"/>
+          </a:xfrm>
+          <a:prstGeom prst="roundRect">
+            <a:avLst/>
+          </a:prstGeom>
+        </p:spPr>
+        <p:style>
+          <a:lnRef idx="1">
+            <a:schemeClr val="accent5"/>
+          </a:lnRef>
+          <a:fillRef idx="2">
+            <a:schemeClr val="accent5"/>
+          </a:fillRef>
+          <a:effectRef idx="1">
+            <a:schemeClr val="accent5"/>
+          </a:effectRef>
+          <a:fontRef idx="minor">
+            <a:schemeClr val="dk1"/>
+          </a:fontRef>
+        </p:style>
+        <p:txBody>
+          <a:bodyPr rtlCol="0" anchor="ctr"/>
+          <a:lstStyle/>
+          <a:p>
+            <a:pPr algn="ctr"/>
+            <a:r>
+              <a:rPr lang="en-US" dirty="0" smtClean="0"/>
+              <a:t>Identity Provider</a:t>
+            </a:r>
+          </a:p>
+          <a:p>
+            <a:pPr algn="ctr"/>
+            <a:r>
+              <a:rPr lang="en-US" dirty="0" smtClean="0"/>
+              <a:t>(SSOFI)</a:t>
+            </a:r>
+            <a:endParaRPr lang="en-US" dirty="0"/>
+          </a:p>
+        </p:txBody>
+      </p:sp>
+      <p:sp>
+        <p:nvSpPr>
+          <p:cNvPr id="3" name="Rounded Rectangle 2"/>
+          <p:cNvSpPr/>
+          <p:nvPr/>
+        </p:nvSpPr>
+        <p:spPr>
+          <a:xfrm>
+            <a:off x="1368012" y="3733800"/>
+            <a:ext cx="2057400" cy="1143000"/>
+          </a:xfrm>
+          <a:prstGeom prst="roundRect">
+            <a:avLst/>
+          </a:prstGeom>
+        </p:spPr>
+        <p:style>
+          <a:lnRef idx="1">
+            <a:schemeClr val="accent5"/>
+          </a:lnRef>
+          <a:fillRef idx="2">
+            <a:schemeClr val="accent5"/>
+          </a:fillRef>
+          <a:effectRef idx="1">
+            <a:schemeClr val="accent5"/>
+          </a:effectRef>
+          <a:fontRef idx="minor">
+            <a:schemeClr val="dk1"/>
+          </a:fontRef>
+        </p:style>
+        <p:txBody>
+          <a:bodyPr rtlCol="0" anchor="ctr"/>
+          <a:lstStyle/>
+          <a:p>
+            <a:pPr algn="ctr"/>
+            <a:r>
+              <a:rPr lang="en-US" dirty="0" smtClean="0"/>
+              <a:t>Client</a:t>
+            </a:r>
+          </a:p>
+          <a:p>
+            <a:pPr algn="ctr"/>
+            <a:r>
+              <a:rPr lang="en-US" dirty="0" smtClean="0"/>
+              <a:t>(Angular JS)</a:t>
+            </a:r>
+            <a:endParaRPr lang="en-US" dirty="0"/>
+          </a:p>
+        </p:txBody>
+      </p:sp>
+      <p:sp>
+        <p:nvSpPr>
+          <p:cNvPr id="4" name="Rounded Rectangle 3"/>
+          <p:cNvSpPr/>
+          <p:nvPr/>
+        </p:nvSpPr>
+        <p:spPr>
+          <a:xfrm>
+            <a:off x="5148943" y="3733800"/>
+            <a:ext cx="2057400" cy="1143000"/>
+          </a:xfrm>
+          <a:prstGeom prst="roundRect">
+            <a:avLst/>
+          </a:prstGeom>
+        </p:spPr>
+        <p:style>
+          <a:lnRef idx="1">
+            <a:schemeClr val="accent5"/>
+          </a:lnRef>
+          <a:fillRef idx="2">
+            <a:schemeClr val="accent5"/>
+          </a:fillRef>
+          <a:effectRef idx="1">
+            <a:schemeClr val="accent5"/>
+          </a:effectRef>
+          <a:fontRef idx="minor">
+            <a:schemeClr val="dk1"/>
+          </a:fontRef>
+        </p:style>
+        <p:txBody>
+          <a:bodyPr rtlCol="0" anchor="ctr"/>
+          <a:lstStyle/>
+          <a:p>
+            <a:pPr algn="ctr"/>
+            <a:r>
+              <a:rPr lang="en-US" dirty="0" smtClean="0"/>
+              <a:t>Server</a:t>
+            </a:r>
+          </a:p>
+          <a:p>
+            <a:pPr algn="ctr"/>
+            <a:r>
+              <a:rPr lang="en-US" dirty="0" smtClean="0"/>
+              <a:t>(Java, Tomcat)</a:t>
+            </a:r>
+            <a:endParaRPr lang="en-US" dirty="0"/>
+          </a:p>
+        </p:txBody>
+      </p:sp>
+      <p:cxnSp>
+        <p:nvCxnSpPr>
+          <p:cNvPr id="8" name="Straight Arrow Connector 7"/>
+          <p:cNvCxnSpPr>
+            <a:stCxn id="3" idx="0"/>
+          </p:cNvCxnSpPr>
+          <p:nvPr/>
+        </p:nvCxnSpPr>
+        <p:spPr>
+          <a:xfrm flipV="1">
+            <a:off x="2396712" y="2536372"/>
+            <a:ext cx="1028700" cy="1197428"/>
+          </a:xfrm>
+          <a:prstGeom prst="straightConnector1">
+            <a:avLst/>
+          </a:prstGeom>
+          <a:ln w="57150">
+            <a:tailEnd type="arrow"/>
+          </a:ln>
+        </p:spPr>
+        <p:style>
+          <a:lnRef idx="1">
+            <a:schemeClr val="accent1"/>
+          </a:lnRef>
+          <a:fillRef idx="0">
+            <a:schemeClr val="accent1"/>
+          </a:fillRef>
+          <a:effectRef idx="0">
+            <a:schemeClr val="accent1"/>
+          </a:effectRef>
+          <a:fontRef idx="minor">
+            <a:schemeClr val="tx1"/>
+          </a:fontRef>
+        </p:style>
+      </p:cxnSp>
+      <p:sp>
+        <p:nvSpPr>
+          <p:cNvPr id="9" name="TextBox 8"/>
+          <p:cNvSpPr txBox="1"/>
+          <p:nvPr/>
+        </p:nvSpPr>
+        <p:spPr>
+          <a:xfrm>
+            <a:off x="1257421" y="2667000"/>
+            <a:ext cx="1868974" cy="646331"/>
+          </a:xfrm>
+          <a:prstGeom prst="rect">
+            <a:avLst/>
+          </a:prstGeom>
+          <a:noFill/>
+        </p:spPr>
+        <p:txBody>
+          <a:bodyPr wrap="none" rtlCol="0">
+            <a:spAutoFit/>
+          </a:bodyPr>
+          <a:lstStyle/>
+          <a:p>
+            <a:pPr algn="ctr"/>
+            <a:r>
+              <a:rPr lang="en-US" dirty="0" smtClean="0"/>
+              <a:t>Deliver Challenge</a:t>
+            </a:r>
+          </a:p>
+          <a:p>
+            <a:pPr algn="ctr"/>
+            <a:r>
+              <a:rPr lang="en-US" dirty="0" smtClean="0"/>
+              <a:t>Generate Token    </a:t>
+            </a:r>
+            <a:endParaRPr lang="en-US" dirty="0"/>
+          </a:p>
+        </p:txBody>
+      </p:sp>
+      <p:sp>
+        <p:nvSpPr>
+          <p:cNvPr id="7" name="Rounded Rectangle 6"/>
+          <p:cNvSpPr/>
+          <p:nvPr/>
+        </p:nvSpPr>
+        <p:spPr>
+          <a:xfrm>
+            <a:off x="5007428" y="1524000"/>
+            <a:ext cx="914401" cy="517069"/>
+          </a:xfrm>
+          <a:prstGeom prst="roundRect">
+            <a:avLst/>
+          </a:prstGeom>
+        </p:spPr>
+        <p:style>
+          <a:lnRef idx="1">
+            <a:schemeClr val="accent4"/>
+          </a:lnRef>
+          <a:fillRef idx="2">
+            <a:schemeClr val="accent4"/>
+          </a:fillRef>
+          <a:effectRef idx="1">
+            <a:schemeClr val="accent4"/>
+          </a:effectRef>
+          <a:fontRef idx="minor">
+            <a:schemeClr val="dk1"/>
+          </a:fontRef>
+        </p:style>
+        <p:txBody>
+          <a:bodyPr lIns="0" tIns="0" rIns="0" bIns="0" rtlCol="0" anchor="ctr"/>
+          <a:lstStyle/>
+          <a:p>
+            <a:pPr algn="ctr"/>
+            <a:r>
+              <a:rPr lang="en-US" sz="1400" dirty="0" smtClean="0"/>
+              <a:t>stored</a:t>
+            </a:r>
+          </a:p>
+          <a:p>
+            <a:pPr algn="ctr"/>
+            <a:r>
+              <a:rPr lang="en-US" sz="1400" dirty="0" smtClean="0"/>
+              <a:t>challenge</a:t>
+            </a:r>
+          </a:p>
+        </p:txBody>
+      </p:sp>
+    </p:spTree>
+    <p:extLst>
+      <p:ext uri="{BB962C8B-B14F-4D97-AF65-F5344CB8AC3E}">
+        <p14:creationId xmlns:p14="http://schemas.microsoft.com/office/powerpoint/2010/main" val="2874069660"/>
+      </p:ext>
+    </p:extLst>
+  </p:cSld>
+  <p:clrMapOvr>
+    <a:masterClrMapping/>
+  </p:clrMapOvr>
+</p:sld>
+</file>
+
+<file path=ppt/slides/slide6.xml><?xml version="1.0" encoding="utf-8"?>
+<p:sld xmlns:a="http://schemas.openxmlformats.org/drawingml/2006/main" xmlns:r="http://schemas.openxmlformats.org/officeDocument/2006/relationships" xmlns:p="http://schemas.openxmlformats.org/presentationml/2006/main">
+  <p:cSld>
+    <p:spTree>
+      <p:nvGrpSpPr>
+        <p:cNvPr id="1" name=""/>
+        <p:cNvGrpSpPr/>
+        <p:nvPr/>
+      </p:nvGrpSpPr>
+      <p:grpSpPr>
+        <a:xfrm>
+          <a:off x="0" y="0"/>
+          <a:ext cx="0" cy="0"/>
+          <a:chOff x="0" y="0"/>
+          <a:chExt cx="0" cy="0"/>
+        </a:xfrm>
+      </p:grpSpPr>
+      <p:sp>
+        <p:nvSpPr>
+          <p:cNvPr id="2" name="Rounded Rectangle 1"/>
+          <p:cNvSpPr/>
+          <p:nvPr/>
+        </p:nvSpPr>
+        <p:spPr>
+          <a:xfrm>
+            <a:off x="3124200" y="1393371"/>
+            <a:ext cx="2057400" cy="1143000"/>
+          </a:xfrm>
+          <a:prstGeom prst="roundRect">
+            <a:avLst/>
+          </a:prstGeom>
+        </p:spPr>
+        <p:style>
+          <a:lnRef idx="1">
+            <a:schemeClr val="accent5"/>
+          </a:lnRef>
+          <a:fillRef idx="2">
+            <a:schemeClr val="accent5"/>
+          </a:fillRef>
+          <a:effectRef idx="1">
+            <a:schemeClr val="accent5"/>
+          </a:effectRef>
+          <a:fontRef idx="minor">
+            <a:schemeClr val="dk1"/>
+          </a:fontRef>
+        </p:style>
+        <p:txBody>
+          <a:bodyPr rtlCol="0" anchor="ctr"/>
+          <a:lstStyle/>
+          <a:p>
+            <a:pPr algn="ctr"/>
+            <a:r>
+              <a:rPr lang="en-US" dirty="0" smtClean="0"/>
+              <a:t>Identity Provider</a:t>
+            </a:r>
+          </a:p>
+          <a:p>
+            <a:pPr algn="ctr"/>
+            <a:r>
+              <a:rPr lang="en-US" dirty="0" smtClean="0"/>
+              <a:t>(SSOFI)</a:t>
+            </a:r>
+            <a:endParaRPr lang="en-US" dirty="0"/>
+          </a:p>
+        </p:txBody>
+      </p:sp>
+      <p:sp>
+        <p:nvSpPr>
+          <p:cNvPr id="3" name="Rounded Rectangle 2"/>
+          <p:cNvSpPr/>
+          <p:nvPr/>
+        </p:nvSpPr>
+        <p:spPr>
+          <a:xfrm>
+            <a:off x="1368012" y="3733800"/>
+            <a:ext cx="2057400" cy="1143000"/>
+          </a:xfrm>
+          <a:prstGeom prst="roundRect">
+            <a:avLst/>
+          </a:prstGeom>
+        </p:spPr>
+        <p:style>
+          <a:lnRef idx="1">
+            <a:schemeClr val="accent5"/>
+          </a:lnRef>
+          <a:fillRef idx="2">
+            <a:schemeClr val="accent5"/>
+          </a:fillRef>
+          <a:effectRef idx="1">
+            <a:schemeClr val="accent5"/>
+          </a:effectRef>
+          <a:fontRef idx="minor">
+            <a:schemeClr val="dk1"/>
+          </a:fontRef>
+        </p:style>
+        <p:txBody>
+          <a:bodyPr rtlCol="0" anchor="ctr"/>
+          <a:lstStyle/>
+          <a:p>
+            <a:pPr algn="ctr"/>
+            <a:r>
+              <a:rPr lang="en-US" dirty="0" smtClean="0"/>
+              <a:t>Client</a:t>
+            </a:r>
+          </a:p>
+          <a:p>
+            <a:pPr algn="ctr"/>
+            <a:r>
+              <a:rPr lang="en-US" dirty="0" smtClean="0"/>
+              <a:t>(Angular JS)</a:t>
+            </a:r>
+            <a:endParaRPr lang="en-US" dirty="0"/>
+          </a:p>
+        </p:txBody>
+      </p:sp>
+      <p:sp>
+        <p:nvSpPr>
+          <p:cNvPr id="4" name="Rounded Rectangle 3"/>
+          <p:cNvSpPr/>
+          <p:nvPr/>
+        </p:nvSpPr>
+        <p:spPr>
+          <a:xfrm>
+            <a:off x="5148943" y="3733800"/>
+            <a:ext cx="2057400" cy="1143000"/>
+          </a:xfrm>
+          <a:prstGeom prst="roundRect">
+            <a:avLst/>
+          </a:prstGeom>
+        </p:spPr>
+        <p:style>
+          <a:lnRef idx="1">
+            <a:schemeClr val="accent5"/>
+          </a:lnRef>
+          <a:fillRef idx="2">
+            <a:schemeClr val="accent5"/>
+          </a:fillRef>
+          <a:effectRef idx="1">
+            <a:schemeClr val="accent5"/>
+          </a:effectRef>
+          <a:fontRef idx="minor">
+            <a:schemeClr val="dk1"/>
+          </a:fontRef>
+        </p:style>
+        <p:txBody>
+          <a:bodyPr rtlCol="0" anchor="ctr"/>
+          <a:lstStyle/>
+          <a:p>
+            <a:pPr algn="ctr"/>
+            <a:r>
+              <a:rPr lang="en-US" dirty="0" smtClean="0"/>
+              <a:t>Server</a:t>
+            </a:r>
+          </a:p>
+          <a:p>
+            <a:pPr algn="ctr"/>
+            <a:r>
+              <a:rPr lang="en-US" dirty="0" smtClean="0"/>
+              <a:t>(Java, Tomcat)</a:t>
+            </a:r>
+            <a:endParaRPr lang="en-US" dirty="0"/>
+          </a:p>
+        </p:txBody>
+      </p:sp>
+      <p:cxnSp>
+        <p:nvCxnSpPr>
+          <p:cNvPr id="8" name="Straight Arrow Connector 7"/>
+          <p:cNvCxnSpPr>
+            <a:stCxn id="3" idx="3"/>
+            <a:endCxn id="4" idx="1"/>
+          </p:cNvCxnSpPr>
+          <p:nvPr/>
+        </p:nvCxnSpPr>
+        <p:spPr>
+          <a:xfrm>
+            <a:off x="3425412" y="4305300"/>
+            <a:ext cx="1723531" cy="0"/>
+          </a:xfrm>
+          <a:prstGeom prst="straightConnector1">
+            <a:avLst/>
+          </a:prstGeom>
+          <a:ln w="57150">
+            <a:tailEnd type="arrow"/>
+          </a:ln>
+        </p:spPr>
+        <p:style>
+          <a:lnRef idx="1">
+            <a:schemeClr val="accent1"/>
+          </a:lnRef>
+          <a:fillRef idx="0">
+            <a:schemeClr val="accent1"/>
+          </a:fillRef>
+          <a:effectRef idx="0">
+            <a:schemeClr val="accent1"/>
+          </a:effectRef>
+          <a:fontRef idx="minor">
+            <a:schemeClr val="tx1"/>
+          </a:fontRef>
+        </p:style>
+      </p:cxnSp>
+      <p:sp>
+        <p:nvSpPr>
+          <p:cNvPr id="9" name="TextBox 8"/>
+          <p:cNvSpPr txBox="1"/>
+          <p:nvPr/>
+        </p:nvSpPr>
+        <p:spPr>
+          <a:xfrm>
+            <a:off x="3516677" y="3549134"/>
+            <a:ext cx="1540999" cy="369332"/>
+          </a:xfrm>
+          <a:prstGeom prst="rect">
+            <a:avLst/>
+          </a:prstGeom>
+          <a:noFill/>
+        </p:spPr>
+        <p:txBody>
+          <a:bodyPr wrap="none" rtlCol="0">
+            <a:spAutoFit/>
+          </a:bodyPr>
+          <a:lstStyle/>
+          <a:p>
+            <a:pPr algn="ctr"/>
+            <a:r>
+              <a:rPr lang="en-US" dirty="0" smtClean="0"/>
+              <a:t>Verify Token    </a:t>
+            </a:r>
+            <a:endParaRPr lang="en-US" dirty="0"/>
+          </a:p>
+        </p:txBody>
+      </p:sp>
+      <p:sp>
+        <p:nvSpPr>
+          <p:cNvPr id="7" name="Rounded Rectangle 6"/>
+          <p:cNvSpPr/>
+          <p:nvPr/>
+        </p:nvSpPr>
+        <p:spPr>
+          <a:xfrm>
+            <a:off x="5007428" y="1524000"/>
+            <a:ext cx="914401" cy="517069"/>
+          </a:xfrm>
+          <a:prstGeom prst="roundRect">
+            <a:avLst/>
+          </a:prstGeom>
+        </p:spPr>
+        <p:style>
+          <a:lnRef idx="1">
+            <a:schemeClr val="accent4"/>
+          </a:lnRef>
+          <a:fillRef idx="2">
+            <a:schemeClr val="accent4"/>
+          </a:fillRef>
+          <a:effectRef idx="1">
+            <a:schemeClr val="accent4"/>
+          </a:effectRef>
+          <a:fontRef idx="minor">
+            <a:schemeClr val="dk1"/>
+          </a:fontRef>
+        </p:style>
+        <p:txBody>
+          <a:bodyPr lIns="0" tIns="0" rIns="0" bIns="0" rtlCol="0" anchor="ctr"/>
+          <a:lstStyle/>
+          <a:p>
+            <a:pPr algn="ctr"/>
+            <a:r>
+              <a:rPr lang="en-US" sz="1400" dirty="0" smtClean="0"/>
+              <a:t>stored</a:t>
+            </a:r>
+          </a:p>
+          <a:p>
+            <a:pPr algn="ctr"/>
+            <a:r>
+              <a:rPr lang="en-US" sz="1400" dirty="0" smtClean="0"/>
+              <a:t>challenge</a:t>
+            </a:r>
+          </a:p>
+        </p:txBody>
+      </p:sp>
+      <p:cxnSp>
+        <p:nvCxnSpPr>
+          <p:cNvPr id="10" name="Straight Arrow Connector 9"/>
+          <p:cNvCxnSpPr>
+            <a:stCxn id="4" idx="0"/>
+          </p:cNvCxnSpPr>
+          <p:nvPr/>
+        </p:nvCxnSpPr>
+        <p:spPr>
+          <a:xfrm flipH="1" flipV="1">
+            <a:off x="4800600" y="2536371"/>
+            <a:ext cx="1377043" cy="1197429"/>
+          </a:xfrm>
+          <a:prstGeom prst="straightConnector1">
+            <a:avLst/>
+          </a:prstGeom>
+          <a:ln w="57150">
+            <a:tailEnd type="arrow"/>
+          </a:ln>
+        </p:spPr>
+        <p:style>
+          <a:lnRef idx="1">
+            <a:schemeClr val="accent1"/>
+          </a:lnRef>
+          <a:fillRef idx="0">
+            <a:schemeClr val="accent1"/>
+          </a:fillRef>
+          <a:effectRef idx="0">
+            <a:schemeClr val="accent1"/>
+          </a:effectRef>
+          <a:fontRef idx="minor">
+            <a:schemeClr val="tx1"/>
+          </a:fontRef>
+        </p:style>
+      </p:cxnSp>
+      <p:sp>
+        <p:nvSpPr>
+          <p:cNvPr id="13" name="TextBox 12"/>
+          <p:cNvSpPr txBox="1"/>
+          <p:nvPr/>
+        </p:nvSpPr>
+        <p:spPr>
+          <a:xfrm>
+            <a:off x="5431971" y="2645229"/>
+            <a:ext cx="1703287" cy="646331"/>
+          </a:xfrm>
+          <a:prstGeom prst="rect">
+            <a:avLst/>
+          </a:prstGeom>
+          <a:noFill/>
+        </p:spPr>
+        <p:txBody>
+          <a:bodyPr wrap="none" rtlCol="0">
+            <a:spAutoFit/>
+          </a:bodyPr>
+          <a:lstStyle/>
+          <a:p>
+            <a:pPr algn="ctr"/>
+            <a:r>
+              <a:rPr lang="en-US" dirty="0" smtClean="0"/>
+              <a:t>Verify Challenge</a:t>
+            </a:r>
+          </a:p>
+          <a:p>
+            <a:pPr algn="ctr"/>
+            <a:r>
+              <a:rPr lang="en-US" dirty="0" smtClean="0"/>
+              <a:t>&amp; Token    </a:t>
+            </a:r>
+            <a:endParaRPr lang="en-US" dirty="0"/>
+          </a:p>
+        </p:txBody>
+      </p:sp>
+    </p:spTree>
+    <p:extLst>
+      <p:ext uri="{BB962C8B-B14F-4D97-AF65-F5344CB8AC3E}">
+        <p14:creationId xmlns:p14="http://schemas.microsoft.com/office/powerpoint/2010/main" val="91116462"/>
+      </p:ext>
+    </p:extLst>
+  </p:cSld>
+  <p:clrMapOvr>
+    <a:masterClrMapping/>
+  </p:clrMapOvr>
+</p:sld>
+</file>
+
+<file path=ppt/slides/slide7.xml><?xml version="1.0" encoding="utf-8"?>
+<p:sld xmlns:a="http://schemas.openxmlformats.org/drawingml/2006/main" xmlns:r="http://schemas.openxmlformats.org/officeDocument/2006/relationships" xmlns:p="http://schemas.openxmlformats.org/presentationml/2006/main">
+  <p:cSld>
+    <p:spTree>
+      <p:nvGrpSpPr>
+        <p:cNvPr id="1" name=""/>
+        <p:cNvGrpSpPr/>
+        <p:nvPr/>
+      </p:nvGrpSpPr>
+      <p:grpSpPr>
+        <a:xfrm>
+          <a:off x="0" y="0"/>
+          <a:ext cx="0" cy="0"/>
+          <a:chOff x="0" y="0"/>
+          <a:chExt cx="0" cy="0"/>
+        </a:xfrm>
+      </p:grpSpPr>
+      <p:sp>
+        <p:nvSpPr>
+          <p:cNvPr id="2" name="Rounded Rectangle 1"/>
+          <p:cNvSpPr/>
+          <p:nvPr/>
+        </p:nvSpPr>
+        <p:spPr>
+          <a:xfrm>
+            <a:off x="3124200" y="1393371"/>
+            <a:ext cx="2057400" cy="1143000"/>
+          </a:xfrm>
+          <a:prstGeom prst="roundRect">
+            <a:avLst/>
+          </a:prstGeom>
+        </p:spPr>
+        <p:style>
+          <a:lnRef idx="1">
+            <a:schemeClr val="accent5"/>
+          </a:lnRef>
+          <a:fillRef idx="2">
+            <a:schemeClr val="accent5"/>
+          </a:fillRef>
+          <a:effectRef idx="1">
+            <a:schemeClr val="accent5"/>
+          </a:effectRef>
+          <a:fontRef idx="minor">
+            <a:schemeClr val="dk1"/>
+          </a:fontRef>
+        </p:style>
+        <p:txBody>
+          <a:bodyPr rtlCol="0" anchor="ctr"/>
+          <a:lstStyle/>
+          <a:p>
+            <a:pPr algn="ctr"/>
+            <a:r>
+              <a:rPr lang="en-US" dirty="0" smtClean="0"/>
+              <a:t>Identity Provider</a:t>
+            </a:r>
+          </a:p>
+          <a:p>
+            <a:pPr algn="ctr"/>
+            <a:r>
+              <a:rPr lang="en-US" dirty="0" smtClean="0"/>
+              <a:t>(SSOFI)</a:t>
+            </a:r>
+            <a:endParaRPr lang="en-US" dirty="0"/>
+          </a:p>
+        </p:txBody>
+      </p:sp>
+      <p:sp>
+        <p:nvSpPr>
+          <p:cNvPr id="3" name="Rounded Rectangle 2"/>
+          <p:cNvSpPr/>
+          <p:nvPr/>
+        </p:nvSpPr>
+        <p:spPr>
+          <a:xfrm>
+            <a:off x="1368012" y="3733800"/>
+            <a:ext cx="2057400" cy="1143000"/>
+          </a:xfrm>
+          <a:prstGeom prst="roundRect">
+            <a:avLst/>
+          </a:prstGeom>
+        </p:spPr>
+        <p:style>
+          <a:lnRef idx="1">
+            <a:schemeClr val="accent5"/>
+          </a:lnRef>
+          <a:fillRef idx="2">
+            <a:schemeClr val="accent5"/>
+          </a:fillRef>
+          <a:effectRef idx="1">
+            <a:schemeClr val="accent5"/>
+          </a:effectRef>
+          <a:fontRef idx="minor">
+            <a:schemeClr val="dk1"/>
+          </a:fontRef>
+        </p:style>
+        <p:txBody>
+          <a:bodyPr rtlCol="0" anchor="ctr"/>
+          <a:lstStyle/>
+          <a:p>
+            <a:pPr algn="ctr"/>
+            <a:r>
+              <a:rPr lang="en-US" dirty="0" smtClean="0"/>
+              <a:t>Client</a:t>
+            </a:r>
+          </a:p>
+          <a:p>
+            <a:pPr algn="ctr"/>
+            <a:r>
+              <a:rPr lang="en-US" dirty="0" smtClean="0"/>
+              <a:t>(Angular JS)</a:t>
+            </a:r>
+            <a:endParaRPr lang="en-US" dirty="0"/>
+          </a:p>
+        </p:txBody>
+      </p:sp>
+      <p:sp>
+        <p:nvSpPr>
+          <p:cNvPr id="4" name="Rounded Rectangle 3"/>
+          <p:cNvSpPr/>
+          <p:nvPr/>
+        </p:nvSpPr>
+        <p:spPr>
+          <a:xfrm>
+            <a:off x="5148943" y="3733800"/>
+            <a:ext cx="2057400" cy="1143000"/>
+          </a:xfrm>
+          <a:prstGeom prst="roundRect">
+            <a:avLst/>
+          </a:prstGeom>
+        </p:spPr>
+        <p:style>
+          <a:lnRef idx="1">
+            <a:schemeClr val="accent5"/>
+          </a:lnRef>
+          <a:fillRef idx="2">
+            <a:schemeClr val="accent5"/>
+          </a:fillRef>
+          <a:effectRef idx="1">
+            <a:schemeClr val="accent5"/>
+          </a:effectRef>
+          <a:fontRef idx="minor">
+            <a:schemeClr val="dk1"/>
+          </a:fontRef>
+        </p:style>
+        <p:txBody>
+          <a:bodyPr rtlCol="0" anchor="ctr"/>
+          <a:lstStyle/>
+          <a:p>
+            <a:pPr algn="ctr"/>
+            <a:r>
+              <a:rPr lang="en-US" dirty="0" smtClean="0"/>
+              <a:t>Server</a:t>
+            </a:r>
+          </a:p>
+          <a:p>
+            <a:pPr algn="ctr"/>
+            <a:r>
+              <a:rPr lang="en-US" dirty="0" smtClean="0"/>
+              <a:t>(Java, Tomcat)</a:t>
+            </a:r>
+            <a:endParaRPr lang="en-US" dirty="0"/>
+          </a:p>
+        </p:txBody>
+      </p:sp>
+      <p:cxnSp>
+        <p:nvCxnSpPr>
+          <p:cNvPr id="5" name="Straight Arrow Connector 4"/>
+          <p:cNvCxnSpPr/>
+          <p:nvPr/>
+        </p:nvCxnSpPr>
+        <p:spPr>
+          <a:xfrm flipV="1">
+            <a:off x="2396712" y="2536371"/>
+            <a:ext cx="1032288" cy="1197429"/>
+          </a:xfrm>
+          <a:prstGeom prst="straightConnector1">
+            <a:avLst/>
+          </a:prstGeom>
+          <a:ln w="57150">
+            <a:tailEnd type="arrow"/>
+          </a:ln>
+        </p:spPr>
+        <p:style>
+          <a:lnRef idx="1">
+            <a:schemeClr val="accent1"/>
+          </a:lnRef>
+          <a:fillRef idx="0">
+            <a:schemeClr val="accent1"/>
+          </a:fillRef>
+          <a:effectRef idx="0">
+            <a:schemeClr val="accent1"/>
+          </a:effectRef>
+          <a:fontRef idx="minor">
+            <a:schemeClr val="tx1"/>
+          </a:fontRef>
+        </p:style>
+      </p:cxnSp>
+      <p:sp>
+        <p:nvSpPr>
+          <p:cNvPr id="7" name="TextBox 6"/>
+          <p:cNvSpPr txBox="1"/>
+          <p:nvPr/>
+        </p:nvSpPr>
+        <p:spPr>
+          <a:xfrm>
+            <a:off x="1980572" y="2667000"/>
+            <a:ext cx="832279" cy="369332"/>
+          </a:xfrm>
+          <a:prstGeom prst="rect">
+            <a:avLst/>
+          </a:prstGeom>
+          <a:noFill/>
+        </p:spPr>
+        <p:txBody>
+          <a:bodyPr wrap="none" rtlCol="0">
+            <a:spAutoFit/>
+          </a:bodyPr>
+          <a:lstStyle/>
+          <a:p>
+            <a:r>
+              <a:rPr lang="en-US" dirty="0" smtClean="0"/>
+              <a:t>Logout</a:t>
+            </a:r>
+            <a:endParaRPr lang="en-US" dirty="0"/>
+          </a:p>
+        </p:txBody>
+      </p:sp>
+      <p:cxnSp>
+        <p:nvCxnSpPr>
+          <p:cNvPr id="8" name="Straight Arrow Connector 7"/>
+          <p:cNvCxnSpPr>
+            <a:stCxn id="3" idx="3"/>
+            <a:endCxn id="4" idx="1"/>
+          </p:cNvCxnSpPr>
+          <p:nvPr/>
+        </p:nvCxnSpPr>
+        <p:spPr>
+          <a:xfrm>
+            <a:off x="3425412" y="4305300"/>
+            <a:ext cx="1723531" cy="0"/>
+          </a:xfrm>
+          <a:prstGeom prst="straightConnector1">
+            <a:avLst/>
+          </a:prstGeom>
+          <a:ln w="57150">
+            <a:tailEnd type="arrow"/>
+          </a:ln>
+        </p:spPr>
+        <p:style>
+          <a:lnRef idx="1">
+            <a:schemeClr val="accent1"/>
+          </a:lnRef>
+          <a:fillRef idx="0">
+            <a:schemeClr val="accent1"/>
+          </a:fillRef>
+          <a:effectRef idx="0">
+            <a:schemeClr val="accent1"/>
+          </a:effectRef>
+          <a:fontRef idx="minor">
+            <a:schemeClr val="tx1"/>
+          </a:fontRef>
+        </p:style>
+      </p:cxnSp>
+      <p:sp>
+        <p:nvSpPr>
+          <p:cNvPr id="10" name="TextBox 9"/>
+          <p:cNvSpPr txBox="1"/>
+          <p:nvPr/>
+        </p:nvSpPr>
+        <p:spPr>
+          <a:xfrm>
+            <a:off x="3871037" y="3733800"/>
+            <a:ext cx="832279" cy="369332"/>
+          </a:xfrm>
+          <a:prstGeom prst="rect">
+            <a:avLst/>
+          </a:prstGeom>
+          <a:noFill/>
+        </p:spPr>
+        <p:txBody>
+          <a:bodyPr wrap="none" rtlCol="0">
+            <a:spAutoFit/>
+          </a:bodyPr>
+          <a:lstStyle/>
+          <a:p>
+            <a:r>
+              <a:rPr lang="en-US" dirty="0" smtClean="0"/>
+              <a:t>Logout</a:t>
+            </a:r>
+            <a:endParaRPr lang="en-US" dirty="0"/>
+          </a:p>
+        </p:txBody>
+      </p:sp>
+    </p:spTree>
+    <p:extLst>
+      <p:ext uri="{BB962C8B-B14F-4D97-AF65-F5344CB8AC3E}">
+        <p14:creationId xmlns:p14="http://schemas.microsoft.com/office/powerpoint/2010/main" val="3398938763"/>
       </p:ext>
     </p:extLst>
   </p:cSld>

</xml_diff>

<commit_message>
new mendo jar, updated template streamer
</commit_message>
<xml_diff>
--- a/spec/ClassDiagram.pptx
+++ b/spec/ClassDiagram.pptx
@@ -12,9 +12,10 @@
     <p:sldId id="262" r:id="rId6"/>
     <p:sldId id="263" r:id="rId7"/>
     <p:sldId id="264" r:id="rId8"/>
+    <p:sldId id="265" r:id="rId9"/>
   </p:sldIdLst>
   <p:sldSz cx="9144000" cy="6858000" type="screen4x3"/>
-  <p:notesSz cx="6858000" cy="9144000"/>
+  <p:notesSz cx="7315200" cy="9601200"/>
   <p:defaultTextStyle>
     <a:defPPr>
       <a:defRPr lang="en-US"/>
@@ -294,7 +295,7 @@
           <a:p>
             <a:fld id="{837CB51B-EB14-4160-B927-04031DCD17B2}" type="datetimeFigureOut">
               <a:rPr lang="en-US" smtClean="0"/>
-              <a:t>10/7/2015</a:t>
+              <a:t>5/19/2016</a:t>
             </a:fld>
             <a:endParaRPr lang="en-US"/>
           </a:p>
@@ -464,7 +465,7 @@
           <a:p>
             <a:fld id="{837CB51B-EB14-4160-B927-04031DCD17B2}" type="datetimeFigureOut">
               <a:rPr lang="en-US" smtClean="0"/>
-              <a:t>10/7/2015</a:t>
+              <a:t>5/19/2016</a:t>
             </a:fld>
             <a:endParaRPr lang="en-US"/>
           </a:p>
@@ -644,7 +645,7 @@
           <a:p>
             <a:fld id="{837CB51B-EB14-4160-B927-04031DCD17B2}" type="datetimeFigureOut">
               <a:rPr lang="en-US" smtClean="0"/>
-              <a:t>10/7/2015</a:t>
+              <a:t>5/19/2016</a:t>
             </a:fld>
             <a:endParaRPr lang="en-US"/>
           </a:p>
@@ -814,7 +815,7 @@
           <a:p>
             <a:fld id="{837CB51B-EB14-4160-B927-04031DCD17B2}" type="datetimeFigureOut">
               <a:rPr lang="en-US" smtClean="0"/>
-              <a:t>10/7/2015</a:t>
+              <a:t>5/19/2016</a:t>
             </a:fld>
             <a:endParaRPr lang="en-US"/>
           </a:p>
@@ -1060,7 +1061,7 @@
           <a:p>
             <a:fld id="{837CB51B-EB14-4160-B927-04031DCD17B2}" type="datetimeFigureOut">
               <a:rPr lang="en-US" smtClean="0"/>
-              <a:t>10/7/2015</a:t>
+              <a:t>5/19/2016</a:t>
             </a:fld>
             <a:endParaRPr lang="en-US"/>
           </a:p>
@@ -1348,7 +1349,7 @@
           <a:p>
             <a:fld id="{837CB51B-EB14-4160-B927-04031DCD17B2}" type="datetimeFigureOut">
               <a:rPr lang="en-US" smtClean="0"/>
-              <a:t>10/7/2015</a:t>
+              <a:t>5/19/2016</a:t>
             </a:fld>
             <a:endParaRPr lang="en-US"/>
           </a:p>
@@ -1770,7 +1771,7 @@
           <a:p>
             <a:fld id="{837CB51B-EB14-4160-B927-04031DCD17B2}" type="datetimeFigureOut">
               <a:rPr lang="en-US" smtClean="0"/>
-              <a:t>10/7/2015</a:t>
+              <a:t>5/19/2016</a:t>
             </a:fld>
             <a:endParaRPr lang="en-US"/>
           </a:p>
@@ -1888,7 +1889,7 @@
           <a:p>
             <a:fld id="{837CB51B-EB14-4160-B927-04031DCD17B2}" type="datetimeFigureOut">
               <a:rPr lang="en-US" smtClean="0"/>
-              <a:t>10/7/2015</a:t>
+              <a:t>5/19/2016</a:t>
             </a:fld>
             <a:endParaRPr lang="en-US"/>
           </a:p>
@@ -1983,7 +1984,7 @@
           <a:p>
             <a:fld id="{837CB51B-EB14-4160-B927-04031DCD17B2}" type="datetimeFigureOut">
               <a:rPr lang="en-US" smtClean="0"/>
-              <a:t>10/7/2015</a:t>
+              <a:t>5/19/2016</a:t>
             </a:fld>
             <a:endParaRPr lang="en-US"/>
           </a:p>
@@ -2260,7 +2261,7 @@
           <a:p>
             <a:fld id="{837CB51B-EB14-4160-B927-04031DCD17B2}" type="datetimeFigureOut">
               <a:rPr lang="en-US" smtClean="0"/>
-              <a:t>10/7/2015</a:t>
+              <a:t>5/19/2016</a:t>
             </a:fld>
             <a:endParaRPr lang="en-US"/>
           </a:p>
@@ -2513,7 +2514,7 @@
           <a:p>
             <a:fld id="{837CB51B-EB14-4160-B927-04031DCD17B2}" type="datetimeFigureOut">
               <a:rPr lang="en-US" smtClean="0"/>
-              <a:t>10/7/2015</a:t>
+              <a:t>5/19/2016</a:t>
             </a:fld>
             <a:endParaRPr lang="en-US"/>
           </a:p>
@@ -2726,7 +2727,7 @@
           <a:p>
             <a:fld id="{837CB51B-EB14-4160-B927-04031DCD17B2}" type="datetimeFigureOut">
               <a:rPr lang="en-US" smtClean="0"/>
-              <a:t>10/7/2015</a:t>
+              <a:t>5/19/2016</a:t>
             </a:fld>
             <a:endParaRPr lang="en-US"/>
           </a:p>
@@ -6173,6 +6174,584 @@
     <p:extLst>
       <p:ext uri="{BB962C8B-B14F-4D97-AF65-F5344CB8AC3E}">
         <p14:creationId xmlns:p14="http://schemas.microsoft.com/office/powerpoint/2010/main" val="3398938763"/>
+      </p:ext>
+    </p:extLst>
+  </p:cSld>
+  <p:clrMapOvr>
+    <a:masterClrMapping/>
+  </p:clrMapOvr>
+</p:sld>
+</file>
+
+<file path=ppt/slides/slide8.xml><?xml version="1.0" encoding="utf-8"?>
+<p:sld xmlns:a="http://schemas.openxmlformats.org/drawingml/2006/main" xmlns:r="http://schemas.openxmlformats.org/officeDocument/2006/relationships" xmlns:p="http://schemas.openxmlformats.org/presentationml/2006/main">
+  <p:cSld>
+    <p:spTree>
+      <p:nvGrpSpPr>
+        <p:cNvPr id="1" name=""/>
+        <p:cNvGrpSpPr/>
+        <p:nvPr/>
+      </p:nvGrpSpPr>
+      <p:grpSpPr>
+        <a:xfrm>
+          <a:off x="0" y="0"/>
+          <a:ext cx="0" cy="0"/>
+          <a:chOff x="0" y="0"/>
+          <a:chExt cx="0" cy="0"/>
+        </a:xfrm>
+      </p:grpSpPr>
+      <p:cxnSp>
+        <p:nvCxnSpPr>
+          <p:cNvPr id="5" name="Straight Arrow Connector 4"/>
+          <p:cNvCxnSpPr/>
+          <p:nvPr/>
+        </p:nvCxnSpPr>
+        <p:spPr>
+          <a:xfrm flipV="1">
+            <a:off x="1759001" y="2150662"/>
+            <a:ext cx="1365164" cy="1614447"/>
+          </a:xfrm>
+          <a:prstGeom prst="straightConnector1">
+            <a:avLst/>
+          </a:prstGeom>
+          <a:ln w="57150">
+            <a:tailEnd type="arrow"/>
+          </a:ln>
+        </p:spPr>
+        <p:style>
+          <a:lnRef idx="1">
+            <a:schemeClr val="accent1"/>
+          </a:lnRef>
+          <a:fillRef idx="0">
+            <a:schemeClr val="accent1"/>
+          </a:fillRef>
+          <a:effectRef idx="0">
+            <a:schemeClr val="accent1"/>
+          </a:effectRef>
+          <a:fontRef idx="minor">
+            <a:schemeClr val="tx1"/>
+          </a:fontRef>
+        </p:style>
+      </p:cxnSp>
+      <p:cxnSp>
+        <p:nvCxnSpPr>
+          <p:cNvPr id="16" name="Straight Arrow Connector 15"/>
+          <p:cNvCxnSpPr/>
+          <p:nvPr/>
+        </p:nvCxnSpPr>
+        <p:spPr>
+          <a:xfrm flipH="1">
+            <a:off x="2079757" y="2150662"/>
+            <a:ext cx="1346724" cy="1614447"/>
+          </a:xfrm>
+          <a:prstGeom prst="straightConnector1">
+            <a:avLst/>
+          </a:prstGeom>
+          <a:ln w="57150">
+            <a:tailEnd type="arrow"/>
+          </a:ln>
+        </p:spPr>
+        <p:style>
+          <a:lnRef idx="1">
+            <a:schemeClr val="accent1"/>
+          </a:lnRef>
+          <a:fillRef idx="0">
+            <a:schemeClr val="accent1"/>
+          </a:fillRef>
+          <a:effectRef idx="0">
+            <a:schemeClr val="accent1"/>
+          </a:effectRef>
+          <a:fontRef idx="minor">
+            <a:schemeClr val="tx1"/>
+          </a:fontRef>
+        </p:style>
+      </p:cxnSp>
+      <p:sp>
+        <p:nvSpPr>
+          <p:cNvPr id="2" name="Rounded Rectangle 1"/>
+          <p:cNvSpPr/>
+          <p:nvPr/>
+        </p:nvSpPr>
+        <p:spPr>
+          <a:xfrm>
+            <a:off x="2721078" y="609600"/>
+            <a:ext cx="2720837" cy="1541062"/>
+          </a:xfrm>
+          <a:prstGeom prst="roundRect">
+            <a:avLst/>
+          </a:prstGeom>
+        </p:spPr>
+        <p:style>
+          <a:lnRef idx="2">
+            <a:schemeClr val="dk1"/>
+          </a:lnRef>
+          <a:fillRef idx="1">
+            <a:schemeClr val="lt1"/>
+          </a:fillRef>
+          <a:effectRef idx="0">
+            <a:schemeClr val="dk1"/>
+          </a:effectRef>
+          <a:fontRef idx="minor">
+            <a:schemeClr val="dk1"/>
+          </a:fontRef>
+        </p:style>
+        <p:txBody>
+          <a:bodyPr rtlCol="0" anchor="ctr"/>
+          <a:lstStyle/>
+          <a:p>
+            <a:pPr algn="ctr"/>
+            <a:r>
+              <a:rPr lang="en-US" sz="2400" dirty="0"/>
+              <a:t>Identity Provider</a:t>
+            </a:r>
+          </a:p>
+          <a:p>
+            <a:pPr algn="ctr"/>
+            <a:r>
+              <a:rPr lang="en-US" sz="2400" dirty="0"/>
+              <a:t>(SSOFI)</a:t>
+            </a:r>
+            <a:endParaRPr lang="en-US" sz="2400" dirty="0"/>
+          </a:p>
+        </p:txBody>
+      </p:sp>
+      <p:sp>
+        <p:nvSpPr>
+          <p:cNvPr id="3" name="Rounded Rectangle 2"/>
+          <p:cNvSpPr/>
+          <p:nvPr/>
+        </p:nvSpPr>
+        <p:spPr>
+          <a:xfrm>
+            <a:off x="398583" y="3765109"/>
+            <a:ext cx="2720837" cy="1541062"/>
+          </a:xfrm>
+          <a:prstGeom prst="roundRect">
+            <a:avLst/>
+          </a:prstGeom>
+        </p:spPr>
+        <p:style>
+          <a:lnRef idx="2">
+            <a:schemeClr val="dk1"/>
+          </a:lnRef>
+          <a:fillRef idx="1">
+            <a:schemeClr val="lt1"/>
+          </a:fillRef>
+          <a:effectRef idx="0">
+            <a:schemeClr val="dk1"/>
+          </a:effectRef>
+          <a:fontRef idx="minor">
+            <a:schemeClr val="dk1"/>
+          </a:fontRef>
+        </p:style>
+        <p:txBody>
+          <a:bodyPr rtlCol="0" anchor="ctr"/>
+          <a:lstStyle/>
+          <a:p>
+            <a:pPr algn="ctr"/>
+            <a:r>
+              <a:rPr lang="en-US" sz="2400" dirty="0"/>
+              <a:t>Client</a:t>
+            </a:r>
+          </a:p>
+          <a:p>
+            <a:pPr algn="ctr"/>
+            <a:r>
+              <a:rPr lang="en-US" sz="2400" dirty="0"/>
+              <a:t>(JavaScript)</a:t>
+            </a:r>
+            <a:endParaRPr lang="en-US" sz="2400" dirty="0"/>
+          </a:p>
+        </p:txBody>
+      </p:sp>
+      <p:sp>
+        <p:nvSpPr>
+          <p:cNvPr id="4" name="Rounded Rectangle 3"/>
+          <p:cNvSpPr/>
+          <p:nvPr/>
+        </p:nvSpPr>
+        <p:spPr>
+          <a:xfrm>
+            <a:off x="5398727" y="3765109"/>
+            <a:ext cx="2720837" cy="1541062"/>
+          </a:xfrm>
+          <a:prstGeom prst="roundRect">
+            <a:avLst/>
+          </a:prstGeom>
+        </p:spPr>
+        <p:style>
+          <a:lnRef idx="2">
+            <a:schemeClr val="dk1"/>
+          </a:lnRef>
+          <a:fillRef idx="1">
+            <a:schemeClr val="lt1"/>
+          </a:fillRef>
+          <a:effectRef idx="0">
+            <a:schemeClr val="dk1"/>
+          </a:effectRef>
+          <a:fontRef idx="minor">
+            <a:schemeClr val="dk1"/>
+          </a:fontRef>
+        </p:style>
+        <p:txBody>
+          <a:bodyPr rtlCol="0" anchor="ctr"/>
+          <a:lstStyle/>
+          <a:p>
+            <a:pPr algn="ctr"/>
+            <a:r>
+              <a:rPr lang="en-US" sz="2400" dirty="0" smtClean="0"/>
+              <a:t>Server</a:t>
+            </a:r>
+          </a:p>
+          <a:p>
+            <a:pPr algn="ctr"/>
+            <a:r>
+              <a:rPr lang="en-US" sz="2400" dirty="0" smtClean="0"/>
+              <a:t>(AA)</a:t>
+            </a:r>
+            <a:endParaRPr lang="en-US" sz="2400" dirty="0"/>
+          </a:p>
+        </p:txBody>
+      </p:sp>
+      <p:cxnSp>
+        <p:nvCxnSpPr>
+          <p:cNvPr id="8" name="Straight Arrow Connector 7"/>
+          <p:cNvCxnSpPr/>
+          <p:nvPr/>
+        </p:nvCxnSpPr>
+        <p:spPr>
+          <a:xfrm>
+            <a:off x="3119417" y="4545039"/>
+            <a:ext cx="2279307" cy="0"/>
+          </a:xfrm>
+          <a:prstGeom prst="straightConnector1">
+            <a:avLst/>
+          </a:prstGeom>
+          <a:ln w="57150">
+            <a:tailEnd type="arrow"/>
+          </a:ln>
+        </p:spPr>
+        <p:style>
+          <a:lnRef idx="1">
+            <a:schemeClr val="accent1"/>
+          </a:lnRef>
+          <a:fillRef idx="0">
+            <a:schemeClr val="accent1"/>
+          </a:fillRef>
+          <a:effectRef idx="0">
+            <a:schemeClr val="accent1"/>
+          </a:effectRef>
+          <a:fontRef idx="minor">
+            <a:schemeClr val="tx1"/>
+          </a:fontRef>
+        </p:style>
+      </p:cxnSp>
+      <p:cxnSp>
+        <p:nvCxnSpPr>
+          <p:cNvPr id="9" name="Straight Arrow Connector 8"/>
+          <p:cNvCxnSpPr/>
+          <p:nvPr/>
+        </p:nvCxnSpPr>
+        <p:spPr>
+          <a:xfrm>
+            <a:off x="3094186" y="4114800"/>
+            <a:ext cx="2279307" cy="0"/>
+          </a:xfrm>
+          <a:prstGeom prst="straightConnector1">
+            <a:avLst/>
+          </a:prstGeom>
+          <a:ln w="57150">
+            <a:tailEnd type="arrow"/>
+          </a:ln>
+        </p:spPr>
+        <p:style>
+          <a:lnRef idx="1">
+            <a:schemeClr val="accent1"/>
+          </a:lnRef>
+          <a:fillRef idx="0">
+            <a:schemeClr val="accent1"/>
+          </a:fillRef>
+          <a:effectRef idx="0">
+            <a:schemeClr val="accent1"/>
+          </a:effectRef>
+          <a:fontRef idx="minor">
+            <a:schemeClr val="tx1"/>
+          </a:fontRef>
+        </p:style>
+      </p:cxnSp>
+      <p:sp>
+        <p:nvSpPr>
+          <p:cNvPr id="11" name="TextBox 10"/>
+          <p:cNvSpPr txBox="1"/>
+          <p:nvPr/>
+        </p:nvSpPr>
+        <p:spPr>
+          <a:xfrm>
+            <a:off x="3119417" y="5079711"/>
+            <a:ext cx="2635979" cy="1200328"/>
+          </a:xfrm>
+          <a:prstGeom prst="rect">
+            <a:avLst/>
+          </a:prstGeom>
+          <a:noFill/>
+        </p:spPr>
+        <p:txBody>
+          <a:bodyPr wrap="none" rtlCol="0">
+            <a:spAutoFit/>
+          </a:bodyPr>
+          <a:lstStyle/>
+          <a:p>
+            <a:r>
+              <a:rPr lang="en-US" sz="2400" dirty="0" smtClean="0"/>
+              <a:t>4. Verify Token</a:t>
+            </a:r>
+          </a:p>
+          <a:p>
+            <a:r>
+              <a:rPr lang="en-US" sz="2400" dirty="0" smtClean="0"/>
+              <a:t>7. Acknowledge </a:t>
+            </a:r>
+          </a:p>
+          <a:p>
+            <a:r>
+              <a:rPr lang="en-US" sz="2400" dirty="0" smtClean="0"/>
+              <a:t>    being logged in</a:t>
+            </a:r>
+            <a:r>
+              <a:rPr lang="en-US" sz="2400" dirty="0" smtClean="0"/>
+              <a:t>    </a:t>
+            </a:r>
+            <a:endParaRPr lang="en-US" sz="2400" dirty="0"/>
+          </a:p>
+        </p:txBody>
+      </p:sp>
+      <p:cxnSp>
+        <p:nvCxnSpPr>
+          <p:cNvPr id="12" name="Straight Arrow Connector 11"/>
+          <p:cNvCxnSpPr/>
+          <p:nvPr/>
+        </p:nvCxnSpPr>
+        <p:spPr>
+          <a:xfrm flipH="1" flipV="1">
+            <a:off x="4938056" y="2150662"/>
+            <a:ext cx="1821090" cy="1614447"/>
+          </a:xfrm>
+          <a:prstGeom prst="straightConnector1">
+            <a:avLst/>
+          </a:prstGeom>
+          <a:ln w="57150">
+            <a:tailEnd type="arrow"/>
+          </a:ln>
+        </p:spPr>
+        <p:style>
+          <a:lnRef idx="1">
+            <a:schemeClr val="accent1"/>
+          </a:lnRef>
+          <a:fillRef idx="0">
+            <a:schemeClr val="accent1"/>
+          </a:fillRef>
+          <a:effectRef idx="0">
+            <a:schemeClr val="accent1"/>
+          </a:effectRef>
+          <a:fontRef idx="minor">
+            <a:schemeClr val="tx1"/>
+          </a:fontRef>
+        </p:style>
+      </p:cxnSp>
+      <p:sp>
+        <p:nvSpPr>
+          <p:cNvPr id="13" name="TextBox 12"/>
+          <p:cNvSpPr txBox="1"/>
+          <p:nvPr/>
+        </p:nvSpPr>
+        <p:spPr>
+          <a:xfrm>
+            <a:off x="5655938" y="2255410"/>
+            <a:ext cx="2998194" cy="830997"/>
+          </a:xfrm>
+          <a:prstGeom prst="rect">
+            <a:avLst/>
+          </a:prstGeom>
+          <a:noFill/>
+        </p:spPr>
+        <p:txBody>
+          <a:bodyPr wrap="none" rtlCol="0">
+            <a:spAutoFit/>
+          </a:bodyPr>
+          <a:lstStyle/>
+          <a:p>
+            <a:pPr algn="ctr"/>
+            <a:r>
+              <a:rPr lang="en-US" sz="2400" dirty="0" smtClean="0"/>
+              <a:t>5 Verify Token </a:t>
+            </a:r>
+          </a:p>
+          <a:p>
+            <a:pPr algn="ctr"/>
+            <a:r>
+              <a:rPr lang="en-US" sz="2400" dirty="0" smtClean="0"/>
+              <a:t>            6. Get identity</a:t>
+            </a:r>
+            <a:r>
+              <a:rPr lang="en-US" sz="2400" dirty="0" smtClean="0"/>
+              <a:t>   </a:t>
+            </a:r>
+            <a:endParaRPr lang="en-US" sz="2400" dirty="0"/>
+          </a:p>
+        </p:txBody>
+      </p:sp>
+      <p:sp>
+        <p:nvSpPr>
+          <p:cNvPr id="14" name="TextBox 13"/>
+          <p:cNvSpPr txBox="1"/>
+          <p:nvPr/>
+        </p:nvSpPr>
+        <p:spPr>
+          <a:xfrm>
+            <a:off x="304800" y="1915318"/>
+            <a:ext cx="2132827" cy="1200328"/>
+          </a:xfrm>
+          <a:prstGeom prst="rect">
+            <a:avLst/>
+          </a:prstGeom>
+          <a:noFill/>
+        </p:spPr>
+        <p:txBody>
+          <a:bodyPr wrap="none" rtlCol="0">
+            <a:spAutoFit/>
+          </a:bodyPr>
+          <a:lstStyle/>
+          <a:p>
+            <a:r>
+              <a:rPr lang="en-US" sz="2400" dirty="0" smtClean="0"/>
+              <a:t>2. Get Token  </a:t>
+            </a:r>
+          </a:p>
+          <a:p>
+            <a:r>
+              <a:rPr lang="en-US" sz="2400" dirty="0"/>
+              <a:t> </a:t>
+            </a:r>
+            <a:r>
+              <a:rPr lang="en-US" sz="2400" dirty="0" smtClean="0"/>
+              <a:t>   for Challenge</a:t>
+            </a:r>
+            <a:endParaRPr lang="en-US" sz="2400" dirty="0" smtClean="0"/>
+          </a:p>
+          <a:p>
+            <a:r>
+              <a:rPr lang="en-US" sz="2400" dirty="0" smtClean="0"/>
+              <a:t>3. Return Token</a:t>
+            </a:r>
+            <a:endParaRPr lang="en-US" sz="2400" dirty="0"/>
+          </a:p>
+        </p:txBody>
+      </p:sp>
+      <p:sp>
+        <p:nvSpPr>
+          <p:cNvPr id="15" name="TextBox 14"/>
+          <p:cNvSpPr txBox="1"/>
+          <p:nvPr/>
+        </p:nvSpPr>
+        <p:spPr>
+          <a:xfrm>
+            <a:off x="3094186" y="3517539"/>
+            <a:ext cx="2229072" cy="461665"/>
+          </a:xfrm>
+          <a:prstGeom prst="rect">
+            <a:avLst/>
+          </a:prstGeom>
+          <a:noFill/>
+        </p:spPr>
+        <p:txBody>
+          <a:bodyPr wrap="none" rtlCol="0">
+            <a:spAutoFit/>
+          </a:bodyPr>
+          <a:lstStyle/>
+          <a:p>
+            <a:pPr algn="ctr"/>
+            <a:r>
+              <a:rPr lang="en-US" sz="2400" dirty="0" smtClean="0"/>
+              <a:t>1. Get </a:t>
+            </a:r>
+            <a:r>
+              <a:rPr lang="en-US" sz="2400" dirty="0" smtClean="0"/>
+              <a:t>Challenge</a:t>
+            </a:r>
+            <a:endParaRPr lang="en-US" sz="2400" dirty="0"/>
+          </a:p>
+        </p:txBody>
+      </p:sp>
+      <p:cxnSp>
+        <p:nvCxnSpPr>
+          <p:cNvPr id="19" name="Straight Arrow Connector 18"/>
+          <p:cNvCxnSpPr/>
+          <p:nvPr/>
+        </p:nvCxnSpPr>
+        <p:spPr>
+          <a:xfrm>
+            <a:off x="5348431" y="2150662"/>
+            <a:ext cx="1806603" cy="1615854"/>
+          </a:xfrm>
+          <a:prstGeom prst="straightConnector1">
+            <a:avLst/>
+          </a:prstGeom>
+          <a:ln w="57150">
+            <a:tailEnd type="arrow"/>
+          </a:ln>
+        </p:spPr>
+        <p:style>
+          <a:lnRef idx="1">
+            <a:schemeClr val="accent1"/>
+          </a:lnRef>
+          <a:fillRef idx="0">
+            <a:schemeClr val="accent1"/>
+          </a:fillRef>
+          <a:effectRef idx="0">
+            <a:schemeClr val="accent1"/>
+          </a:effectRef>
+          <a:fontRef idx="minor">
+            <a:schemeClr val="tx1"/>
+          </a:fontRef>
+        </p:style>
+      </p:cxnSp>
+      <p:cxnSp>
+        <p:nvCxnSpPr>
+          <p:cNvPr id="22" name="Straight Arrow Connector 21"/>
+          <p:cNvCxnSpPr/>
+          <p:nvPr/>
+        </p:nvCxnSpPr>
+        <p:spPr>
+          <a:xfrm flipH="1">
+            <a:off x="3124165" y="4895221"/>
+            <a:ext cx="2274560" cy="0"/>
+          </a:xfrm>
+          <a:prstGeom prst="straightConnector1">
+            <a:avLst/>
+          </a:prstGeom>
+          <a:ln w="57150">
+            <a:tailEnd type="arrow"/>
+          </a:ln>
+        </p:spPr>
+        <p:style>
+          <a:lnRef idx="1">
+            <a:schemeClr val="accent1"/>
+          </a:lnRef>
+          <a:fillRef idx="0">
+            <a:schemeClr val="accent1"/>
+          </a:fillRef>
+          <a:effectRef idx="0">
+            <a:schemeClr val="accent1"/>
+          </a:effectRef>
+          <a:fontRef idx="minor">
+            <a:schemeClr val="tx1"/>
+          </a:fontRef>
+        </p:style>
+      </p:cxnSp>
+    </p:spTree>
+    <p:extLst>
+      <p:ext uri="{BB962C8B-B14F-4D97-AF65-F5344CB8AC3E}">
+        <p14:creationId xmlns:p14="http://schemas.microsoft.com/office/powerpoint/2010/main" val="1740827898"/>
       </p:ext>
     </p:extLst>
   </p:cSld>

</xml_diff>